<commit_message>
Arreglando la tarea de redes
</commit_message>
<xml_diff>
--- a/REDES DE COMPUTADORA/UNIDAD VII/UNIDAD VII - PLANEACION DE UNA RED LAN.pptx
+++ b/REDES DE COMPUTADORA/UNIDAD VII/UNIDAD VII - PLANEACION DE UNA RED LAN.pptx
@@ -5,7 +5,7 @@
     <p:sldMasterId id="2147483657" r:id="rId1"/>
   </p:sldMasterIdLst>
   <p:notesMasterIdLst>
-    <p:notesMasterId r:id="rId30"/>
+    <p:notesMasterId r:id="rId31"/>
   </p:notesMasterIdLst>
   <p:sldIdLst>
     <p:sldId id="256" r:id="rId2"/>
@@ -30,36 +30,37 @@
     <p:sldId id="327" r:id="rId21"/>
     <p:sldId id="328" r:id="rId22"/>
     <p:sldId id="322" r:id="rId23"/>
-    <p:sldId id="309" r:id="rId24"/>
+    <p:sldId id="329" r:id="rId24"/>
     <p:sldId id="310" r:id="rId25"/>
     <p:sldId id="311" r:id="rId26"/>
     <p:sldId id="312" r:id="rId27"/>
     <p:sldId id="313" r:id="rId28"/>
-    <p:sldId id="297" r:id="rId29"/>
+    <p:sldId id="330" r:id="rId29"/>
+    <p:sldId id="297" r:id="rId30"/>
   </p:sldIdLst>
   <p:sldSz cx="9144000" cy="6858000" type="letter"/>
   <p:notesSz cx="6858000" cy="9144000"/>
   <p:embeddedFontLst>
     <p:embeddedFont>
       <p:font typeface="Segoe UI" panose="020B0502040204020203" pitchFamily="34" charset="0"/>
-      <p:regular r:id="rId31"/>
-      <p:bold r:id="rId32"/>
-      <p:italic r:id="rId33"/>
-      <p:boldItalic r:id="rId34"/>
+      <p:regular r:id="rId32"/>
+      <p:bold r:id="rId33"/>
+      <p:italic r:id="rId34"/>
+      <p:boldItalic r:id="rId35"/>
     </p:embeddedFont>
     <p:embeddedFont>
       <p:font typeface="Titillium Web" panose="00000500000000000000" pitchFamily="2" charset="0"/>
-      <p:regular r:id="rId35"/>
-      <p:bold r:id="rId36"/>
-      <p:italic r:id="rId37"/>
-      <p:boldItalic r:id="rId38"/>
+      <p:regular r:id="rId36"/>
+      <p:bold r:id="rId37"/>
+      <p:italic r:id="rId38"/>
+      <p:boldItalic r:id="rId39"/>
     </p:embeddedFont>
     <p:embeddedFont>
       <p:font typeface="Titillium Web Light" panose="00000400000000000000" pitchFamily="2" charset="0"/>
-      <p:regular r:id="rId39"/>
-      <p:bold r:id="rId40"/>
-      <p:italic r:id="rId41"/>
-      <p:boldItalic r:id="rId42"/>
+      <p:regular r:id="rId40"/>
+      <p:bold r:id="rId41"/>
+      <p:italic r:id="rId42"/>
+      <p:boldItalic r:id="rId43"/>
     </p:embeddedFont>
   </p:embeddedFontLst>
   <p:defaultTextStyle>
@@ -303,6 +304,10 @@
             <p14:sldId id="300"/>
             <p14:sldId id="301"/>
             <p14:sldId id="302"/>
+          </p14:sldIdLst>
+        </p14:section>
+        <p14:section name="Equipos" id="{BFDADCDF-C7D8-4753-AA2C-3E4177B25C60}">
+          <p14:sldIdLst>
             <p14:sldId id="299"/>
             <p14:sldId id="303"/>
             <p14:sldId id="304"/>
@@ -318,11 +323,20 @@
             <p14:sldId id="327"/>
             <p14:sldId id="328"/>
             <p14:sldId id="322"/>
-            <p14:sldId id="309"/>
+          </p14:sldIdLst>
+        </p14:section>
+        <p14:section name="Distribucion" id="{9F5652AD-BDEC-45A8-A973-782CA0336BD8}">
+          <p14:sldIdLst>
+            <p14:sldId id="329"/>
             <p14:sldId id="310"/>
             <p14:sldId id="311"/>
             <p14:sldId id="312"/>
             <p14:sldId id="313"/>
+          </p14:sldIdLst>
+        </p14:section>
+        <p14:section name="Cables" id="{48C036FE-AFB4-4490-B01D-5EA2F1802352}">
+          <p14:sldIdLst>
+            <p14:sldId id="330"/>
             <p14:sldId id="297"/>
           </p14:sldIdLst>
         </p14:section>
@@ -6265,7 +6279,7 @@
         <p:cNvPr id="1" name="Shape 50">
           <a:extLst>
             <a:ext uri="{FF2B5EF4-FFF2-40B4-BE49-F238E27FC236}">
-              <a16:creationId xmlns:a16="http://schemas.microsoft.com/office/drawing/2014/main" id="{802313AC-2B1F-2346-E3E4-AF612A95B88C}"/>
+              <a16:creationId xmlns:a16="http://schemas.microsoft.com/office/drawing/2014/main" id="{080FF631-0598-DD78-0D25-52D9C21230E9}"/>
             </a:ext>
           </a:extLst>
         </p:cNvPr>
@@ -6285,7 +6299,7 @@
           <p:cNvPr id="51" name="Google Shape;51;g35f391192_00:notes">
             <a:extLst>
               <a:ext uri="{FF2B5EF4-FFF2-40B4-BE49-F238E27FC236}">
-                <a16:creationId xmlns:a16="http://schemas.microsoft.com/office/drawing/2014/main" id="{4E669343-193E-C145-83D2-2B4BC9E546FD}"/>
+                <a16:creationId xmlns:a16="http://schemas.microsoft.com/office/drawing/2014/main" id="{4E8AD710-CDC2-6819-7C0B-16546A295B3E}"/>
               </a:ext>
             </a:extLst>
           </p:cNvPr>
@@ -6332,7 +6346,7 @@
           <p:cNvPr id="52" name="Google Shape;52;g35f391192_00:notes">
             <a:extLst>
               <a:ext uri="{FF2B5EF4-FFF2-40B4-BE49-F238E27FC236}">
-                <a16:creationId xmlns:a16="http://schemas.microsoft.com/office/drawing/2014/main" id="{D0AEDE38-130F-EA9D-7B20-1E93EE3F651A}"/>
+                <a16:creationId xmlns:a16="http://schemas.microsoft.com/office/drawing/2014/main" id="{B69106E6-8AEC-A7B7-E48A-1026E098EEB6}"/>
               </a:ext>
             </a:extLst>
           </p:cNvPr>
@@ -6374,7 +6388,7 @@
     </p:spTree>
     <p:extLst>
       <p:ext uri="{BB962C8B-B14F-4D97-AF65-F5344CB8AC3E}">
-        <p14:creationId xmlns:p14="http://schemas.microsoft.com/office/powerpoint/2010/main" val="2649196968"/>
+        <p14:creationId xmlns:p14="http://schemas.microsoft.com/office/powerpoint/2010/main" val="3643906429"/>
       </p:ext>
     </p:extLst>
   </p:cSld>
@@ -6900,6 +6914,133 @@
         <p:cNvPr id="1" name="Shape 50">
           <a:extLst>
             <a:ext uri="{FF2B5EF4-FFF2-40B4-BE49-F238E27FC236}">
+              <a16:creationId xmlns:a16="http://schemas.microsoft.com/office/drawing/2014/main" id="{C46B255E-3398-7602-3907-D165160783C4}"/>
+            </a:ext>
+          </a:extLst>
+        </p:cNvPr>
+        <p:cNvGrpSpPr/>
+        <p:nvPr/>
+      </p:nvGrpSpPr>
+      <p:grpSpPr>
+        <a:xfrm>
+          <a:off x="0" y="0"/>
+          <a:ext cx="0" cy="0"/>
+          <a:chOff x="0" y="0"/>
+          <a:chExt cx="0" cy="0"/>
+        </a:xfrm>
+      </p:grpSpPr>
+      <p:sp>
+        <p:nvSpPr>
+          <p:cNvPr id="51" name="Google Shape;51;g35f391192_00:notes">
+            <a:extLst>
+              <a:ext uri="{FF2B5EF4-FFF2-40B4-BE49-F238E27FC236}">
+                <a16:creationId xmlns:a16="http://schemas.microsoft.com/office/drawing/2014/main" id="{925D1FFC-9CD7-BE39-1AF9-9A9DC5539932}"/>
+              </a:ext>
+            </a:extLst>
+          </p:cNvPr>
+          <p:cNvSpPr>
+            <a:spLocks noGrp="1" noRot="1" noChangeAspect="1"/>
+          </p:cNvSpPr>
+          <p:nvPr>
+            <p:ph type="sldImg" idx="2"/>
+          </p:nvPr>
+        </p:nvSpPr>
+        <p:spPr>
+          <a:xfrm>
+            <a:off x="1143000" y="685800"/>
+            <a:ext cx="4572000" cy="3429000"/>
+          </a:xfrm>
+          <a:custGeom>
+            <a:avLst/>
+            <a:gdLst/>
+            <a:ahLst/>
+            <a:cxnLst/>
+            <a:rect l="l" t="t" r="r" b="b"/>
+            <a:pathLst>
+              <a:path w="120000" h="120000" extrusionOk="0">
+                <a:moveTo>
+                  <a:pt x="0" y="0"/>
+                </a:moveTo>
+                <a:lnTo>
+                  <a:pt x="120000" y="0"/>
+                </a:lnTo>
+                <a:lnTo>
+                  <a:pt x="120000" y="120000"/>
+                </a:lnTo>
+                <a:lnTo>
+                  <a:pt x="0" y="120000"/>
+                </a:lnTo>
+                <a:close/>
+              </a:path>
+            </a:pathLst>
+          </a:custGeom>
+        </p:spPr>
+      </p:sp>
+      <p:sp>
+        <p:nvSpPr>
+          <p:cNvPr id="52" name="Google Shape;52;g35f391192_00:notes">
+            <a:extLst>
+              <a:ext uri="{FF2B5EF4-FFF2-40B4-BE49-F238E27FC236}">
+                <a16:creationId xmlns:a16="http://schemas.microsoft.com/office/drawing/2014/main" id="{B0FAB7C4-0201-E3BB-3D70-4BC00E884F4B}"/>
+              </a:ext>
+            </a:extLst>
+          </p:cNvPr>
+          <p:cNvSpPr txBox="1">
+            <a:spLocks noGrp="1"/>
+          </p:cNvSpPr>
+          <p:nvPr>
+            <p:ph type="body" idx="1"/>
+          </p:nvPr>
+        </p:nvSpPr>
+        <p:spPr>
+          <a:xfrm>
+            <a:off x="685800" y="4343400"/>
+            <a:ext cx="5486400" cy="4114800"/>
+          </a:xfrm>
+          <a:prstGeom prst="rect">
+            <a:avLst/>
+          </a:prstGeom>
+        </p:spPr>
+        <p:txBody>
+          <a:bodyPr spcFirstLastPara="1" wrap="square" lIns="91425" tIns="91425" rIns="91425" bIns="91425" anchor="t" anchorCtr="0">
+            <a:noAutofit/>
+          </a:bodyPr>
+          <a:lstStyle/>
+          <a:p>
+            <a:pPr marL="0" lvl="0" indent="0" algn="l" rtl="0">
+              <a:spcBef>
+                <a:spcPts val="0"/>
+              </a:spcBef>
+              <a:spcAft>
+                <a:spcPts val="0"/>
+              </a:spcAft>
+              <a:buNone/>
+            </a:pPr>
+            <a:endParaRPr/>
+          </a:p>
+        </p:txBody>
+      </p:sp>
+    </p:spTree>
+    <p:extLst>
+      <p:ext uri="{BB962C8B-B14F-4D97-AF65-F5344CB8AC3E}">
+        <p14:creationId xmlns:p14="http://schemas.microsoft.com/office/powerpoint/2010/main" val="1580428977"/>
+      </p:ext>
+    </p:extLst>
+  </p:cSld>
+  <p:clrMapOvr>
+    <a:masterClrMapping/>
+  </p:clrMapOvr>
+</p:notes>
+</file>
+
+<file path=ppt/notesSlides/notesSlide29.xml><?xml version="1.0" encoding="utf-8"?>
+<p:notes xmlns:a="http://schemas.openxmlformats.org/drawingml/2006/main" xmlns:r="http://schemas.openxmlformats.org/officeDocument/2006/relationships" xmlns:p="http://schemas.openxmlformats.org/presentationml/2006/main" showMasterSp="0" showMasterPhAnim="0">
+  <p:cSld>
+    <p:spTree>
+      <p:nvGrpSpPr>
+        <p:cNvPr id="1" name="Shape 50">
+          <a:extLst>
+            <a:ext uri="{FF2B5EF4-FFF2-40B4-BE49-F238E27FC236}">
               <a16:creationId xmlns:a16="http://schemas.microsoft.com/office/drawing/2014/main" id="{2899D950-CFFF-178F-F41B-1AD058195A6D}"/>
             </a:ext>
           </a:extLst>
@@ -8765,7 +8906,7 @@
   <p:transition>
     <p:fade thruBlk="1"/>
   </p:transition>
-  <p:hf hdr="0" ftr="0" dt="0"/>
+  <p:hf sldNum="0" hdr="0" ftr="0" dt="0"/>
   <p:txStyles>
     <p:titleStyle>
       <a:defPPr marR="0" lvl="0" algn="l" rtl="0">
@@ -34015,7 +34156,7 @@
         <p:cNvPr id="1" name="Shape 53">
           <a:extLst>
             <a:ext uri="{FF2B5EF4-FFF2-40B4-BE49-F238E27FC236}">
-              <a16:creationId xmlns:a16="http://schemas.microsoft.com/office/drawing/2014/main" id="{600339C4-0CBB-0D04-4264-CBB7C10201B5}"/>
+              <a16:creationId xmlns:a16="http://schemas.microsoft.com/office/drawing/2014/main" id="{604C1D2D-4B0A-635E-3B0B-5D2CC9A7DE67}"/>
             </a:ext>
           </a:extLst>
         </p:cNvPr>
@@ -34035,7 +34176,7 @@
           <p:cNvPr id="8" name="Google Shape;75;p14">
             <a:extLst>
               <a:ext uri="{FF2B5EF4-FFF2-40B4-BE49-F238E27FC236}">
-                <a16:creationId xmlns:a16="http://schemas.microsoft.com/office/drawing/2014/main" id="{86B9ADAD-2497-A2F9-9EAB-11B22F2E5A73}"/>
+                <a16:creationId xmlns:a16="http://schemas.microsoft.com/office/drawing/2014/main" id="{87075960-8DCD-892A-C96A-C84EE185D342}"/>
               </a:ext>
             </a:extLst>
           </p:cNvPr>
@@ -34081,7 +34222,7 @@
           <p:cNvPr id="4" name="Google Shape;60;p12">
             <a:extLst>
               <a:ext uri="{FF2B5EF4-FFF2-40B4-BE49-F238E27FC236}">
-                <a16:creationId xmlns:a16="http://schemas.microsoft.com/office/drawing/2014/main" id="{9097EEBA-7252-7593-5FDC-17FFFF875003}"/>
+                <a16:creationId xmlns:a16="http://schemas.microsoft.com/office/drawing/2014/main" id="{80845125-E13A-76ED-C3BF-ED16C7D88762}"/>
               </a:ext>
             </a:extLst>
           </p:cNvPr>
@@ -34345,7 +34486,7 @@
                 </a:solidFill>
                 <a:latin typeface="Titillium Web Light" panose="020F0502020204030204" pitchFamily="2" charset="0"/>
               </a:rPr>
-              <a:t>Presentaremos el esquema de la distribución de los equipos por cada piso dentro de la red LAN.</a:t>
+              <a:t>La distribución de los equipos por cada piso dentro de la red LAN.</a:t>
             </a:r>
             <a:endParaRPr lang="en-US" sz="2000" b="1" dirty="0"/>
           </a:p>
@@ -34356,7 +34497,7 @@
           <p:cNvPr id="7" name="Imagen 6">
             <a:extLst>
               <a:ext uri="{FF2B5EF4-FFF2-40B4-BE49-F238E27FC236}">
-                <a16:creationId xmlns:a16="http://schemas.microsoft.com/office/drawing/2014/main" id="{4F177866-ADFC-CEFB-0F7F-5826F6A27758}"/>
+                <a16:creationId xmlns:a16="http://schemas.microsoft.com/office/drawing/2014/main" id="{EB2E8124-D0C5-1AAD-0924-D62632184A55}"/>
               </a:ext>
             </a:extLst>
           </p:cNvPr>
@@ -34367,14 +34508,13 @@
         </p:nvPicPr>
         <p:blipFill>
           <a:blip r:embed="rId3"/>
-          <a:stretch>
-            <a:fillRect/>
-          </a:stretch>
+          <a:srcRect b="47309"/>
+          <a:stretch/>
         </p:blipFill>
         <p:spPr>
           <a:xfrm>
-            <a:off x="4572000" y="4388850"/>
-            <a:ext cx="3850120" cy="2156067"/>
+            <a:off x="5426856" y="3782033"/>
+            <a:ext cx="3299827" cy="2313139"/>
           </a:xfrm>
           <a:prstGeom prst="rect">
             <a:avLst/>
@@ -34386,7 +34526,7 @@
           <p:cNvPr id="9" name="Google Shape;54;p11">
             <a:extLst>
               <a:ext uri="{FF2B5EF4-FFF2-40B4-BE49-F238E27FC236}">
-                <a16:creationId xmlns:a16="http://schemas.microsoft.com/office/drawing/2014/main" id="{4F83D040-733F-607C-E1EE-55D45CD2DA3E}"/>
+                <a16:creationId xmlns:a16="http://schemas.microsoft.com/office/drawing/2014/main" id="{26545DA6-8F33-7F28-8F3B-363778A64C00}"/>
               </a:ext>
             </a:extLst>
           </p:cNvPr>
@@ -34671,7 +34811,7 @@
     </p:spTree>
     <p:extLst>
       <p:ext uri="{BB962C8B-B14F-4D97-AF65-F5344CB8AC3E}">
-        <p14:creationId xmlns:p14="http://schemas.microsoft.com/office/powerpoint/2010/main" val="2896419629"/>
+        <p14:creationId xmlns:p14="http://schemas.microsoft.com/office/powerpoint/2010/main" val="486046530"/>
       </p:ext>
     </p:extLst>
   </p:cSld>
@@ -35371,120 +35511,6 @@
       </p:sp>
       <p:sp>
         <p:nvSpPr>
-          <p:cNvPr id="96" name="Rectángulo 95">
-            <a:extLst>
-              <a:ext uri="{FF2B5EF4-FFF2-40B4-BE49-F238E27FC236}">
-                <a16:creationId xmlns:a16="http://schemas.microsoft.com/office/drawing/2014/main" id="{9F517741-3AE3-1496-2E21-B99F8DEF6AA1}"/>
-              </a:ext>
-            </a:extLst>
-          </p:cNvPr>
-          <p:cNvSpPr>
-            <a:spLocks noChangeAspect="1"/>
-          </p:cNvSpPr>
-          <p:nvPr/>
-        </p:nvSpPr>
-        <p:spPr>
-          <a:xfrm>
-            <a:off x="1316391" y="314418"/>
-            <a:ext cx="307100" cy="307100"/>
-          </a:xfrm>
-          <a:prstGeom prst="rect">
-            <a:avLst/>
-          </a:prstGeom>
-          <a:solidFill>
-            <a:srgbClr val="FAC400"/>
-          </a:solidFill>
-        </p:spPr>
-        <p:style>
-          <a:lnRef idx="2">
-            <a:schemeClr val="accent1">
-              <a:shade val="15000"/>
-            </a:schemeClr>
-          </a:lnRef>
-          <a:fillRef idx="1">
-            <a:schemeClr val="accent1"/>
-          </a:fillRef>
-          <a:effectRef idx="0">
-            <a:schemeClr val="accent1"/>
-          </a:effectRef>
-          <a:fontRef idx="minor">
-            <a:schemeClr val="lt1"/>
-          </a:fontRef>
-        </p:style>
-        <p:txBody>
-          <a:bodyPr rtlCol="0" anchor="ctr"/>
-          <a:lstStyle/>
-          <a:p>
-            <a:pPr algn="ctr"/>
-            <a:endParaRPr lang="es-VE" dirty="0">
-              <a:solidFill>
-                <a:schemeClr val="bg1"/>
-              </a:solidFill>
-              <a:latin typeface="Segoe UI" panose="020B0502040204020203" pitchFamily="34" charset="0"/>
-              <a:cs typeface="Segoe UI" panose="020B0502040204020203" pitchFamily="34" charset="0"/>
-            </a:endParaRPr>
-          </a:p>
-        </p:txBody>
-      </p:sp>
-      <p:sp>
-        <p:nvSpPr>
-          <p:cNvPr id="97" name="Rectángulo 96">
-            <a:extLst>
-              <a:ext uri="{FF2B5EF4-FFF2-40B4-BE49-F238E27FC236}">
-                <a16:creationId xmlns:a16="http://schemas.microsoft.com/office/drawing/2014/main" id="{69DD9EA3-8617-09BC-4EF2-16491070CB98}"/>
-              </a:ext>
-            </a:extLst>
-          </p:cNvPr>
-          <p:cNvSpPr>
-            <a:spLocks noChangeAspect="1"/>
-          </p:cNvSpPr>
-          <p:nvPr/>
-        </p:nvSpPr>
-        <p:spPr>
-          <a:xfrm>
-            <a:off x="2191607" y="309517"/>
-            <a:ext cx="307100" cy="307100"/>
-          </a:xfrm>
-          <a:prstGeom prst="rect">
-            <a:avLst/>
-          </a:prstGeom>
-          <a:solidFill>
-            <a:srgbClr val="FAC400"/>
-          </a:solidFill>
-        </p:spPr>
-        <p:style>
-          <a:lnRef idx="2">
-            <a:schemeClr val="accent1">
-              <a:shade val="15000"/>
-            </a:schemeClr>
-          </a:lnRef>
-          <a:fillRef idx="1">
-            <a:schemeClr val="accent1"/>
-          </a:fillRef>
-          <a:effectRef idx="0">
-            <a:schemeClr val="accent1"/>
-          </a:effectRef>
-          <a:fontRef idx="minor">
-            <a:schemeClr val="lt1"/>
-          </a:fontRef>
-        </p:style>
-        <p:txBody>
-          <a:bodyPr rtlCol="0" anchor="ctr"/>
-          <a:lstStyle/>
-          <a:p>
-            <a:pPr algn="ctr"/>
-            <a:endParaRPr lang="es-VE" dirty="0">
-              <a:solidFill>
-                <a:schemeClr val="bg1"/>
-              </a:solidFill>
-              <a:latin typeface="Segoe UI" panose="020B0502040204020203" pitchFamily="34" charset="0"/>
-              <a:cs typeface="Segoe UI" panose="020B0502040204020203" pitchFamily="34" charset="0"/>
-            </a:endParaRPr>
-          </a:p>
-        </p:txBody>
-      </p:sp>
-      <p:sp>
-        <p:nvSpPr>
           <p:cNvPr id="98" name="Rectángulo 97">
             <a:extLst>
               <a:ext uri="{FF2B5EF4-FFF2-40B4-BE49-F238E27FC236}">
@@ -35499,7 +35525,7 @@
         </p:nvSpPr>
         <p:spPr>
           <a:xfrm>
-            <a:off x="3076186" y="304616"/>
+            <a:off x="2222017" y="4796878"/>
             <a:ext cx="307100" cy="307100"/>
           </a:xfrm>
           <a:prstGeom prst="rect">
@@ -35556,7 +35582,7 @@
         </p:nvSpPr>
         <p:spPr>
           <a:xfrm>
-            <a:off x="3693949" y="314418"/>
+            <a:off x="3211593" y="4866158"/>
             <a:ext cx="307100" cy="307100"/>
           </a:xfrm>
           <a:prstGeom prst="rect">
@@ -35613,7 +35639,7 @@
         </p:nvSpPr>
         <p:spPr>
           <a:xfrm>
-            <a:off x="4889039" y="314418"/>
+            <a:off x="4034870" y="4806680"/>
             <a:ext cx="307100" cy="307100"/>
           </a:xfrm>
           <a:prstGeom prst="rect">
@@ -35670,7 +35696,7 @@
         </p:nvSpPr>
         <p:spPr>
           <a:xfrm>
-            <a:off x="5764255" y="315384"/>
+            <a:off x="4910086" y="4807646"/>
             <a:ext cx="307100" cy="307100"/>
           </a:xfrm>
           <a:prstGeom prst="rect">
@@ -35725,7 +35751,7 @@
         </p:nvSpPr>
         <p:spPr>
           <a:xfrm>
-            <a:off x="968678" y="804398"/>
+            <a:off x="1242022" y="341790"/>
             <a:ext cx="307101" cy="307100"/>
           </a:xfrm>
           <a:prstGeom prst="rect">
@@ -35782,567 +35808,7 @@
         </p:nvSpPr>
         <p:spPr>
           <a:xfrm>
-            <a:off x="964150" y="1245202"/>
-            <a:ext cx="288000" cy="288000"/>
-          </a:xfrm>
-          <a:prstGeom prst="rect">
-            <a:avLst/>
-          </a:prstGeom>
-          <a:solidFill>
-            <a:srgbClr val="00B0F0"/>
-          </a:solidFill>
-        </p:spPr>
-        <p:style>
-          <a:lnRef idx="2">
-            <a:schemeClr val="accent1">
-              <a:shade val="15000"/>
-            </a:schemeClr>
-          </a:lnRef>
-          <a:fillRef idx="1">
-            <a:schemeClr val="accent1"/>
-          </a:fillRef>
-          <a:effectRef idx="0">
-            <a:schemeClr val="accent1"/>
-          </a:effectRef>
-          <a:fontRef idx="minor">
-            <a:schemeClr val="lt1"/>
-          </a:fontRef>
-        </p:style>
-        <p:txBody>
-          <a:bodyPr rtlCol="0" anchor="ctr"/>
-          <a:lstStyle/>
-          <a:p>
-            <a:pPr algn="ctr"/>
-            <a:endParaRPr lang="es-VE" dirty="0">
-              <a:solidFill>
-                <a:schemeClr val="bg1"/>
-              </a:solidFill>
-              <a:latin typeface="Segoe UI" panose="020B0502040204020203" pitchFamily="34" charset="0"/>
-              <a:cs typeface="Segoe UI" panose="020B0502040204020203" pitchFamily="34" charset="0"/>
-            </a:endParaRPr>
-          </a:p>
-        </p:txBody>
-      </p:sp>
-      <p:sp>
-        <p:nvSpPr>
-          <p:cNvPr id="111" name="Rectángulo 110">
-            <a:extLst>
-              <a:ext uri="{FF2B5EF4-FFF2-40B4-BE49-F238E27FC236}">
-                <a16:creationId xmlns:a16="http://schemas.microsoft.com/office/drawing/2014/main" id="{4FADC661-4C1B-750D-DE0A-93DAEA77D99B}"/>
-              </a:ext>
-            </a:extLst>
-          </p:cNvPr>
-          <p:cNvSpPr/>
-          <p:nvPr/>
-        </p:nvSpPr>
-        <p:spPr>
-          <a:xfrm>
-            <a:off x="1868461" y="804398"/>
-            <a:ext cx="307101" cy="307100"/>
-          </a:xfrm>
-          <a:prstGeom prst="rect">
-            <a:avLst/>
-          </a:prstGeom>
-          <a:solidFill>
-            <a:srgbClr val="00BE4C"/>
-          </a:solidFill>
-        </p:spPr>
-        <p:style>
-          <a:lnRef idx="2">
-            <a:schemeClr val="accent1">
-              <a:shade val="15000"/>
-            </a:schemeClr>
-          </a:lnRef>
-          <a:fillRef idx="1">
-            <a:schemeClr val="accent1"/>
-          </a:fillRef>
-          <a:effectRef idx="0">
-            <a:schemeClr val="accent1"/>
-          </a:effectRef>
-          <a:fontRef idx="minor">
-            <a:schemeClr val="lt1"/>
-          </a:fontRef>
-        </p:style>
-        <p:txBody>
-          <a:bodyPr rtlCol="0" anchor="ctr"/>
-          <a:lstStyle/>
-          <a:p>
-            <a:pPr algn="ctr"/>
-            <a:endParaRPr lang="es-VE" dirty="0">
-              <a:solidFill>
-                <a:schemeClr val="bg1"/>
-              </a:solidFill>
-              <a:latin typeface="Segoe UI" panose="020B0502040204020203" pitchFamily="34" charset="0"/>
-              <a:cs typeface="Segoe UI" panose="020B0502040204020203" pitchFamily="34" charset="0"/>
-            </a:endParaRPr>
-          </a:p>
-        </p:txBody>
-      </p:sp>
-      <p:sp>
-        <p:nvSpPr>
-          <p:cNvPr id="112" name="Rectángulo 111">
-            <a:extLst>
-              <a:ext uri="{FF2B5EF4-FFF2-40B4-BE49-F238E27FC236}">
-                <a16:creationId xmlns:a16="http://schemas.microsoft.com/office/drawing/2014/main" id="{CB7033DE-27F7-9FB0-CAD3-5A9C3C0291EB}"/>
-              </a:ext>
-            </a:extLst>
-          </p:cNvPr>
-          <p:cNvSpPr>
-            <a:spLocks noChangeAspect="1"/>
-          </p:cNvSpPr>
-          <p:nvPr/>
-        </p:nvSpPr>
-        <p:spPr>
-          <a:xfrm>
-            <a:off x="1885167" y="1245202"/>
-            <a:ext cx="288000" cy="288000"/>
-          </a:xfrm>
-          <a:prstGeom prst="rect">
-            <a:avLst/>
-          </a:prstGeom>
-          <a:solidFill>
-            <a:srgbClr val="00B0F0"/>
-          </a:solidFill>
-        </p:spPr>
-        <p:style>
-          <a:lnRef idx="2">
-            <a:schemeClr val="accent1">
-              <a:shade val="15000"/>
-            </a:schemeClr>
-          </a:lnRef>
-          <a:fillRef idx="1">
-            <a:schemeClr val="accent1"/>
-          </a:fillRef>
-          <a:effectRef idx="0">
-            <a:schemeClr val="accent1"/>
-          </a:effectRef>
-          <a:fontRef idx="minor">
-            <a:schemeClr val="lt1"/>
-          </a:fontRef>
-        </p:style>
-        <p:txBody>
-          <a:bodyPr rtlCol="0" anchor="ctr"/>
-          <a:lstStyle/>
-          <a:p>
-            <a:pPr algn="ctr"/>
-            <a:endParaRPr lang="es-VE" dirty="0">
-              <a:solidFill>
-                <a:schemeClr val="bg1"/>
-              </a:solidFill>
-              <a:latin typeface="Segoe UI" panose="020B0502040204020203" pitchFamily="34" charset="0"/>
-              <a:cs typeface="Segoe UI" panose="020B0502040204020203" pitchFamily="34" charset="0"/>
-            </a:endParaRPr>
-          </a:p>
-        </p:txBody>
-      </p:sp>
-      <p:sp>
-        <p:nvSpPr>
-          <p:cNvPr id="113" name="Rectángulo 112">
-            <a:extLst>
-              <a:ext uri="{FF2B5EF4-FFF2-40B4-BE49-F238E27FC236}">
-                <a16:creationId xmlns:a16="http://schemas.microsoft.com/office/drawing/2014/main" id="{9F6ADDD2-0D1E-AAD9-A404-B14558850E22}"/>
-              </a:ext>
-            </a:extLst>
-          </p:cNvPr>
-          <p:cNvSpPr/>
-          <p:nvPr/>
-        </p:nvSpPr>
-        <p:spPr>
-          <a:xfrm>
-            <a:off x="2761040" y="804398"/>
-            <a:ext cx="307101" cy="307100"/>
-          </a:xfrm>
-          <a:prstGeom prst="rect">
-            <a:avLst/>
-          </a:prstGeom>
-          <a:solidFill>
-            <a:srgbClr val="00BE4C"/>
-          </a:solidFill>
-        </p:spPr>
-        <p:style>
-          <a:lnRef idx="2">
-            <a:schemeClr val="accent1">
-              <a:shade val="15000"/>
-            </a:schemeClr>
-          </a:lnRef>
-          <a:fillRef idx="1">
-            <a:schemeClr val="accent1"/>
-          </a:fillRef>
-          <a:effectRef idx="0">
-            <a:schemeClr val="accent1"/>
-          </a:effectRef>
-          <a:fontRef idx="minor">
-            <a:schemeClr val="lt1"/>
-          </a:fontRef>
-        </p:style>
-        <p:txBody>
-          <a:bodyPr rtlCol="0" anchor="ctr"/>
-          <a:lstStyle/>
-          <a:p>
-            <a:pPr algn="ctr"/>
-            <a:endParaRPr lang="es-VE" dirty="0">
-              <a:solidFill>
-                <a:schemeClr val="bg1"/>
-              </a:solidFill>
-              <a:latin typeface="Segoe UI" panose="020B0502040204020203" pitchFamily="34" charset="0"/>
-              <a:cs typeface="Segoe UI" panose="020B0502040204020203" pitchFamily="34" charset="0"/>
-            </a:endParaRPr>
-          </a:p>
-        </p:txBody>
-      </p:sp>
-      <p:sp>
-        <p:nvSpPr>
-          <p:cNvPr id="114" name="Rectángulo 113">
-            <a:extLst>
-              <a:ext uri="{FF2B5EF4-FFF2-40B4-BE49-F238E27FC236}">
-                <a16:creationId xmlns:a16="http://schemas.microsoft.com/office/drawing/2014/main" id="{172368E7-57B2-A14A-EB92-22FC62E6EDAF}"/>
-              </a:ext>
-            </a:extLst>
-          </p:cNvPr>
-          <p:cNvSpPr>
-            <a:spLocks noChangeAspect="1"/>
-          </p:cNvSpPr>
-          <p:nvPr/>
-        </p:nvSpPr>
-        <p:spPr>
-          <a:xfrm>
-            <a:off x="2765223" y="1212990"/>
-            <a:ext cx="288000" cy="288000"/>
-          </a:xfrm>
-          <a:prstGeom prst="rect">
-            <a:avLst/>
-          </a:prstGeom>
-          <a:solidFill>
-            <a:srgbClr val="00B0F0"/>
-          </a:solidFill>
-        </p:spPr>
-        <p:style>
-          <a:lnRef idx="2">
-            <a:schemeClr val="accent1">
-              <a:shade val="15000"/>
-            </a:schemeClr>
-          </a:lnRef>
-          <a:fillRef idx="1">
-            <a:schemeClr val="accent1"/>
-          </a:fillRef>
-          <a:effectRef idx="0">
-            <a:schemeClr val="accent1"/>
-          </a:effectRef>
-          <a:fontRef idx="minor">
-            <a:schemeClr val="lt1"/>
-          </a:fontRef>
-        </p:style>
-        <p:txBody>
-          <a:bodyPr rtlCol="0" anchor="ctr"/>
-          <a:lstStyle/>
-          <a:p>
-            <a:pPr algn="ctr"/>
-            <a:endParaRPr lang="es-VE" dirty="0">
-              <a:solidFill>
-                <a:schemeClr val="bg1"/>
-              </a:solidFill>
-              <a:latin typeface="Segoe UI" panose="020B0502040204020203" pitchFamily="34" charset="0"/>
-              <a:cs typeface="Segoe UI" panose="020B0502040204020203" pitchFamily="34" charset="0"/>
-            </a:endParaRPr>
-          </a:p>
-        </p:txBody>
-      </p:sp>
-      <p:sp>
-        <p:nvSpPr>
-          <p:cNvPr id="115" name="Rectángulo 114">
-            <a:extLst>
-              <a:ext uri="{FF2B5EF4-FFF2-40B4-BE49-F238E27FC236}">
-                <a16:creationId xmlns:a16="http://schemas.microsoft.com/office/drawing/2014/main" id="{F2F31703-6E47-73DB-62AE-04E8AE266D07}"/>
-              </a:ext>
-            </a:extLst>
-          </p:cNvPr>
-          <p:cNvSpPr/>
-          <p:nvPr/>
-        </p:nvSpPr>
-        <p:spPr>
-          <a:xfrm>
-            <a:off x="3680459" y="1043544"/>
-            <a:ext cx="307101" cy="307100"/>
-          </a:xfrm>
-          <a:prstGeom prst="rect">
-            <a:avLst/>
-          </a:prstGeom>
-          <a:solidFill>
-            <a:srgbClr val="00BE4C"/>
-          </a:solidFill>
-        </p:spPr>
-        <p:style>
-          <a:lnRef idx="2">
-            <a:schemeClr val="accent1">
-              <a:shade val="15000"/>
-            </a:schemeClr>
-          </a:lnRef>
-          <a:fillRef idx="1">
-            <a:schemeClr val="accent1"/>
-          </a:fillRef>
-          <a:effectRef idx="0">
-            <a:schemeClr val="accent1"/>
-          </a:effectRef>
-          <a:fontRef idx="minor">
-            <a:schemeClr val="lt1"/>
-          </a:fontRef>
-        </p:style>
-        <p:txBody>
-          <a:bodyPr rtlCol="0" anchor="ctr"/>
-          <a:lstStyle/>
-          <a:p>
-            <a:pPr algn="ctr"/>
-            <a:endParaRPr lang="es-VE" dirty="0">
-              <a:solidFill>
-                <a:schemeClr val="bg1"/>
-              </a:solidFill>
-              <a:latin typeface="Segoe UI" panose="020B0502040204020203" pitchFamily="34" charset="0"/>
-              <a:cs typeface="Segoe UI" panose="020B0502040204020203" pitchFamily="34" charset="0"/>
-            </a:endParaRPr>
-          </a:p>
-        </p:txBody>
-      </p:sp>
-      <p:sp>
-        <p:nvSpPr>
-          <p:cNvPr id="116" name="Rectángulo 115">
-            <a:extLst>
-              <a:ext uri="{FF2B5EF4-FFF2-40B4-BE49-F238E27FC236}">
-                <a16:creationId xmlns:a16="http://schemas.microsoft.com/office/drawing/2014/main" id="{A0192117-6063-474B-6C10-2D08822BF53A}"/>
-              </a:ext>
-            </a:extLst>
-          </p:cNvPr>
-          <p:cNvSpPr>
-            <a:spLocks noChangeAspect="1"/>
-          </p:cNvSpPr>
-          <p:nvPr/>
-        </p:nvSpPr>
-        <p:spPr>
-          <a:xfrm>
-            <a:off x="3684107" y="1486103"/>
-            <a:ext cx="288000" cy="288000"/>
-          </a:xfrm>
-          <a:prstGeom prst="rect">
-            <a:avLst/>
-          </a:prstGeom>
-          <a:solidFill>
-            <a:srgbClr val="00B0F0"/>
-          </a:solidFill>
-        </p:spPr>
-        <p:style>
-          <a:lnRef idx="2">
-            <a:schemeClr val="accent1">
-              <a:shade val="15000"/>
-            </a:schemeClr>
-          </a:lnRef>
-          <a:fillRef idx="1">
-            <a:schemeClr val="accent1"/>
-          </a:fillRef>
-          <a:effectRef idx="0">
-            <a:schemeClr val="accent1"/>
-          </a:effectRef>
-          <a:fontRef idx="minor">
-            <a:schemeClr val="lt1"/>
-          </a:fontRef>
-        </p:style>
-        <p:txBody>
-          <a:bodyPr rtlCol="0" anchor="ctr"/>
-          <a:lstStyle/>
-          <a:p>
-            <a:pPr algn="ctr"/>
-            <a:endParaRPr lang="es-VE" dirty="0">
-              <a:solidFill>
-                <a:schemeClr val="bg1"/>
-              </a:solidFill>
-              <a:latin typeface="Segoe UI" panose="020B0502040204020203" pitchFamily="34" charset="0"/>
-              <a:cs typeface="Segoe UI" panose="020B0502040204020203" pitchFamily="34" charset="0"/>
-            </a:endParaRPr>
-          </a:p>
-        </p:txBody>
-      </p:sp>
-      <p:sp>
-        <p:nvSpPr>
-          <p:cNvPr id="117" name="Rectángulo 116">
-            <a:extLst>
-              <a:ext uri="{FF2B5EF4-FFF2-40B4-BE49-F238E27FC236}">
-                <a16:creationId xmlns:a16="http://schemas.microsoft.com/office/drawing/2014/main" id="{FD6247E1-9343-717E-302A-2238DB0ECDC9}"/>
-              </a:ext>
-            </a:extLst>
-          </p:cNvPr>
-          <p:cNvSpPr/>
-          <p:nvPr/>
-        </p:nvSpPr>
-        <p:spPr>
-          <a:xfrm>
-            <a:off x="4568115" y="804398"/>
-            <a:ext cx="307101" cy="307100"/>
-          </a:xfrm>
-          <a:prstGeom prst="rect">
-            <a:avLst/>
-          </a:prstGeom>
-          <a:solidFill>
-            <a:srgbClr val="00BE4C"/>
-          </a:solidFill>
-        </p:spPr>
-        <p:style>
-          <a:lnRef idx="2">
-            <a:schemeClr val="accent1">
-              <a:shade val="15000"/>
-            </a:schemeClr>
-          </a:lnRef>
-          <a:fillRef idx="1">
-            <a:schemeClr val="accent1"/>
-          </a:fillRef>
-          <a:effectRef idx="0">
-            <a:schemeClr val="accent1"/>
-          </a:effectRef>
-          <a:fontRef idx="minor">
-            <a:schemeClr val="lt1"/>
-          </a:fontRef>
-        </p:style>
-        <p:txBody>
-          <a:bodyPr rtlCol="0" anchor="ctr"/>
-          <a:lstStyle/>
-          <a:p>
-            <a:pPr algn="ctr"/>
-            <a:endParaRPr lang="es-VE" dirty="0">
-              <a:solidFill>
-                <a:schemeClr val="bg1"/>
-              </a:solidFill>
-              <a:latin typeface="Segoe UI" panose="020B0502040204020203" pitchFamily="34" charset="0"/>
-              <a:cs typeface="Segoe UI" panose="020B0502040204020203" pitchFamily="34" charset="0"/>
-            </a:endParaRPr>
-          </a:p>
-        </p:txBody>
-      </p:sp>
-      <p:sp>
-        <p:nvSpPr>
-          <p:cNvPr id="118" name="Rectángulo 117">
-            <a:extLst>
-              <a:ext uri="{FF2B5EF4-FFF2-40B4-BE49-F238E27FC236}">
-                <a16:creationId xmlns:a16="http://schemas.microsoft.com/office/drawing/2014/main" id="{7CA60F76-918E-941A-67C5-EB55A8229653}"/>
-              </a:ext>
-            </a:extLst>
-          </p:cNvPr>
-          <p:cNvSpPr>
-            <a:spLocks noChangeAspect="1"/>
-          </p:cNvSpPr>
-          <p:nvPr/>
-        </p:nvSpPr>
-        <p:spPr>
-          <a:xfrm>
-            <a:off x="4561906" y="1245202"/>
-            <a:ext cx="288000" cy="288000"/>
-          </a:xfrm>
-          <a:prstGeom prst="rect">
-            <a:avLst/>
-          </a:prstGeom>
-          <a:solidFill>
-            <a:srgbClr val="00B0F0"/>
-          </a:solidFill>
-        </p:spPr>
-        <p:style>
-          <a:lnRef idx="2">
-            <a:schemeClr val="accent1">
-              <a:shade val="15000"/>
-            </a:schemeClr>
-          </a:lnRef>
-          <a:fillRef idx="1">
-            <a:schemeClr val="accent1"/>
-          </a:fillRef>
-          <a:effectRef idx="0">
-            <a:schemeClr val="accent1"/>
-          </a:effectRef>
-          <a:fontRef idx="minor">
-            <a:schemeClr val="lt1"/>
-          </a:fontRef>
-        </p:style>
-        <p:txBody>
-          <a:bodyPr rtlCol="0" anchor="ctr"/>
-          <a:lstStyle/>
-          <a:p>
-            <a:pPr algn="ctr"/>
-            <a:endParaRPr lang="es-VE" dirty="0">
-              <a:solidFill>
-                <a:schemeClr val="bg1"/>
-              </a:solidFill>
-              <a:latin typeface="Segoe UI" panose="020B0502040204020203" pitchFamily="34" charset="0"/>
-              <a:cs typeface="Segoe UI" panose="020B0502040204020203" pitchFamily="34" charset="0"/>
-            </a:endParaRPr>
-          </a:p>
-        </p:txBody>
-      </p:sp>
-      <p:sp>
-        <p:nvSpPr>
-          <p:cNvPr id="119" name="Rectángulo 118">
-            <a:extLst>
-              <a:ext uri="{FF2B5EF4-FFF2-40B4-BE49-F238E27FC236}">
-                <a16:creationId xmlns:a16="http://schemas.microsoft.com/office/drawing/2014/main" id="{95FB9BB6-B402-212C-96EC-DBE0F3E67E75}"/>
-              </a:ext>
-            </a:extLst>
-          </p:cNvPr>
-          <p:cNvSpPr/>
-          <p:nvPr/>
-        </p:nvSpPr>
-        <p:spPr>
-          <a:xfrm>
-            <a:off x="5447668" y="804398"/>
-            <a:ext cx="307101" cy="307100"/>
-          </a:xfrm>
-          <a:prstGeom prst="rect">
-            <a:avLst/>
-          </a:prstGeom>
-          <a:solidFill>
-            <a:srgbClr val="00BE4C"/>
-          </a:solidFill>
-        </p:spPr>
-        <p:style>
-          <a:lnRef idx="2">
-            <a:schemeClr val="accent1">
-              <a:shade val="15000"/>
-            </a:schemeClr>
-          </a:lnRef>
-          <a:fillRef idx="1">
-            <a:schemeClr val="accent1"/>
-          </a:fillRef>
-          <a:effectRef idx="0">
-            <a:schemeClr val="accent1"/>
-          </a:effectRef>
-          <a:fontRef idx="minor">
-            <a:schemeClr val="lt1"/>
-          </a:fontRef>
-        </p:style>
-        <p:txBody>
-          <a:bodyPr rtlCol="0" anchor="ctr"/>
-          <a:lstStyle/>
-          <a:p>
-            <a:pPr algn="ctr"/>
-            <a:endParaRPr lang="es-VE" dirty="0">
-              <a:solidFill>
-                <a:schemeClr val="bg1"/>
-              </a:solidFill>
-              <a:latin typeface="Segoe UI" panose="020B0502040204020203" pitchFamily="34" charset="0"/>
-              <a:cs typeface="Segoe UI" panose="020B0502040204020203" pitchFamily="34" charset="0"/>
-            </a:endParaRPr>
-          </a:p>
-        </p:txBody>
-      </p:sp>
-      <p:sp>
-        <p:nvSpPr>
-          <p:cNvPr id="120" name="Rectángulo 119">
-            <a:extLst>
-              <a:ext uri="{FF2B5EF4-FFF2-40B4-BE49-F238E27FC236}">
-                <a16:creationId xmlns:a16="http://schemas.microsoft.com/office/drawing/2014/main" id="{1E037806-6BB1-EFFC-E9DF-F6B9211626F8}"/>
-              </a:ext>
-            </a:extLst>
-          </p:cNvPr>
-          <p:cNvSpPr>
-            <a:spLocks noChangeAspect="1"/>
-          </p:cNvSpPr>
-          <p:nvPr/>
-        </p:nvSpPr>
-        <p:spPr>
-          <a:xfrm>
-            <a:off x="5461022" y="1234302"/>
+            <a:off x="1001941" y="764988"/>
             <a:ext cx="288000" cy="288000"/>
           </a:xfrm>
           <a:prstGeom prst="rect">
@@ -36399,7 +35865,7 @@
         </p:nvSpPr>
         <p:spPr>
           <a:xfrm>
-            <a:off x="2918828" y="3686734"/>
+            <a:off x="2933148" y="3474146"/>
             <a:ext cx="360000" cy="360000"/>
           </a:xfrm>
           <a:prstGeom prst="rect">
@@ -36454,7 +35920,7 @@
         </p:nvGrpSpPr>
         <p:grpSpPr>
           <a:xfrm rot="10800000">
-            <a:off x="2059153" y="4032658"/>
+            <a:off x="2085628" y="3964615"/>
             <a:ext cx="307101" cy="716348"/>
             <a:chOff x="2339330" y="3087530"/>
             <a:chExt cx="307101" cy="716348"/>
@@ -36587,7 +36053,7 @@
         </p:nvGrpSpPr>
         <p:grpSpPr>
           <a:xfrm rot="10800000">
-            <a:off x="3220082" y="4419106"/>
+            <a:off x="2969331" y="3994392"/>
             <a:ext cx="307101" cy="716348"/>
             <a:chOff x="2339330" y="3087530"/>
             <a:chExt cx="307101" cy="716348"/>
@@ -36720,7 +36186,7 @@
         </p:nvGrpSpPr>
         <p:grpSpPr>
           <a:xfrm rot="10800000">
-            <a:off x="5001276" y="4380713"/>
+            <a:off x="4752013" y="3964615"/>
             <a:ext cx="307101" cy="716348"/>
             <a:chOff x="2339330" y="3087530"/>
             <a:chExt cx="307101" cy="716348"/>
@@ -36853,7 +36319,7 @@
         </p:nvGrpSpPr>
         <p:grpSpPr>
           <a:xfrm rot="10800000">
-            <a:off x="4083211" y="4390832"/>
+            <a:off x="3904258" y="3964615"/>
             <a:ext cx="307101" cy="716348"/>
             <a:chOff x="2339330" y="3087530"/>
             <a:chExt cx="307101" cy="716348"/>
@@ -37045,7 +36511,7 @@
         </p:nvSpPr>
         <p:spPr>
           <a:xfrm>
-            <a:off x="1119149" y="2228715"/>
+            <a:off x="1099271" y="2248593"/>
             <a:ext cx="360000" cy="360000"/>
           </a:xfrm>
           <a:prstGeom prst="rect">
@@ -37495,28 +36961,26 @@
       </p:sp>
       <p:sp>
         <p:nvSpPr>
-          <p:cNvPr id="149" name="Rectángulo 148">
+          <p:cNvPr id="2" name="Rectángulo 1">
             <a:extLst>
               <a:ext uri="{FF2B5EF4-FFF2-40B4-BE49-F238E27FC236}">
-                <a16:creationId xmlns:a16="http://schemas.microsoft.com/office/drawing/2014/main" id="{58C11FEF-A50B-2DE5-CA76-CF4802470B29}"/>
+                <a16:creationId xmlns:a16="http://schemas.microsoft.com/office/drawing/2014/main" id="{79069F55-E0D2-D75B-54A1-EC6FB346EC2E}"/>
               </a:ext>
             </a:extLst>
           </p:cNvPr>
-          <p:cNvSpPr>
-            <a:spLocks noChangeAspect="1"/>
-          </p:cNvSpPr>
+          <p:cNvSpPr/>
           <p:nvPr/>
         </p:nvSpPr>
         <p:spPr>
           <a:xfrm>
-            <a:off x="4117726" y="314418"/>
-            <a:ext cx="307100" cy="307100"/>
+            <a:off x="2116829" y="345624"/>
+            <a:ext cx="307101" cy="307100"/>
           </a:xfrm>
           <a:prstGeom prst="rect">
             <a:avLst/>
           </a:prstGeom>
           <a:solidFill>
-            <a:srgbClr val="FAC400"/>
+            <a:srgbClr val="00BE4C"/>
           </a:solidFill>
         </p:spPr>
         <p:style>
@@ -37552,288 +37016,506 @@
       </p:sp>
       <p:sp>
         <p:nvSpPr>
-          <p:cNvPr id="150" name="Google Shape;54;p11">
+          <p:cNvPr id="3" name="Rectángulo 2">
             <a:extLst>
               <a:ext uri="{FF2B5EF4-FFF2-40B4-BE49-F238E27FC236}">
-                <a16:creationId xmlns:a16="http://schemas.microsoft.com/office/drawing/2014/main" id="{DFEEDE02-92AC-6868-648B-A3CF0F5252F5}"/>
+                <a16:creationId xmlns:a16="http://schemas.microsoft.com/office/drawing/2014/main" id="{1B3ED966-3F16-AB3B-9869-77108DBD4332}"/>
               </a:ext>
             </a:extLst>
           </p:cNvPr>
-          <p:cNvSpPr txBox="1">
-            <a:spLocks/>
+          <p:cNvSpPr>
+            <a:spLocks noChangeAspect="1"/>
           </p:cNvSpPr>
           <p:nvPr/>
         </p:nvSpPr>
         <p:spPr>
           <a:xfrm>
-            <a:off x="8585200" y="6516159"/>
-            <a:ext cx="558800" cy="341841"/>
+            <a:off x="1876748" y="768822"/>
+            <a:ext cx="288000" cy="288000"/>
           </a:xfrm>
           <a:prstGeom prst="rect">
             <a:avLst/>
           </a:prstGeom>
-          <a:noFill/>
-          <a:ln>
-            <a:noFill/>
-          </a:ln>
+          <a:solidFill>
+            <a:srgbClr val="00B0F0"/>
+          </a:solidFill>
         </p:spPr>
+        <p:style>
+          <a:lnRef idx="2">
+            <a:schemeClr val="accent1">
+              <a:shade val="15000"/>
+            </a:schemeClr>
+          </a:lnRef>
+          <a:fillRef idx="1">
+            <a:schemeClr val="accent1"/>
+          </a:fillRef>
+          <a:effectRef idx="0">
+            <a:schemeClr val="accent1"/>
+          </a:effectRef>
+          <a:fontRef idx="minor">
+            <a:schemeClr val="lt1"/>
+          </a:fontRef>
+        </p:style>
         <p:txBody>
-          <a:bodyPr spcFirstLastPara="1" wrap="square" lIns="0" tIns="0" rIns="0" bIns="0" anchor="t" anchorCtr="0">
-            <a:noAutofit/>
-          </a:bodyPr>
-          <a:lstStyle>
-            <a:defPPr marR="0" lvl="0" algn="l" rtl="0">
-              <a:lnSpc>
-                <a:spcPct val="100000"/>
-              </a:lnSpc>
-              <a:spcBef>
-                <a:spcPts val="0"/>
-              </a:spcBef>
-              <a:spcAft>
-                <a:spcPts val="0"/>
-              </a:spcAft>
-            </a:defPPr>
-            <a:lvl1pPr marR="0" lvl="0" algn="l" rtl="0">
-              <a:lnSpc>
-                <a:spcPct val="100000"/>
-              </a:lnSpc>
-              <a:spcBef>
-                <a:spcPts val="0"/>
-              </a:spcBef>
-              <a:spcAft>
-                <a:spcPts val="0"/>
-              </a:spcAft>
-              <a:buClr>
-                <a:schemeClr val="lt1"/>
-              </a:buClr>
-              <a:buSzPts val="6000"/>
-              <a:buFont typeface="Titillium Web"/>
-              <a:buNone/>
-              <a:defRPr sz="8000" b="1" i="0" u="none" strike="noStrike" cap="none">
-                <a:solidFill>
-                  <a:schemeClr val="lt1"/>
-                </a:solidFill>
-                <a:latin typeface="Titillium Web"/>
-                <a:ea typeface="Titillium Web"/>
-                <a:cs typeface="Titillium Web"/>
-                <a:sym typeface="Titillium Web"/>
-              </a:defRPr>
-            </a:lvl1pPr>
-            <a:lvl2pPr marR="0" lvl="1" algn="l" rtl="0">
-              <a:lnSpc>
-                <a:spcPct val="100000"/>
-              </a:lnSpc>
-              <a:spcBef>
-                <a:spcPts val="0"/>
-              </a:spcBef>
-              <a:spcAft>
-                <a:spcPts val="0"/>
-              </a:spcAft>
-              <a:buClr>
-                <a:schemeClr val="lt1"/>
-              </a:buClr>
-              <a:buSzPts val="6000"/>
-              <a:buFont typeface="Titillium Web"/>
-              <a:buNone/>
-              <a:defRPr sz="8000" b="1" i="0" u="none" strike="noStrike" cap="none">
-                <a:solidFill>
-                  <a:schemeClr val="lt1"/>
-                </a:solidFill>
-                <a:latin typeface="Titillium Web"/>
-                <a:ea typeface="Titillium Web"/>
-                <a:cs typeface="Titillium Web"/>
-                <a:sym typeface="Titillium Web"/>
-              </a:defRPr>
-            </a:lvl2pPr>
-            <a:lvl3pPr marR="0" lvl="2" algn="l" rtl="0">
-              <a:lnSpc>
-                <a:spcPct val="100000"/>
-              </a:lnSpc>
-              <a:spcBef>
-                <a:spcPts val="0"/>
-              </a:spcBef>
-              <a:spcAft>
-                <a:spcPts val="0"/>
-              </a:spcAft>
-              <a:buClr>
-                <a:schemeClr val="lt1"/>
-              </a:buClr>
-              <a:buSzPts val="6000"/>
-              <a:buFont typeface="Titillium Web"/>
-              <a:buNone/>
-              <a:defRPr sz="8000" b="1" i="0" u="none" strike="noStrike" cap="none">
-                <a:solidFill>
-                  <a:schemeClr val="lt1"/>
-                </a:solidFill>
-                <a:latin typeface="Titillium Web"/>
-                <a:ea typeface="Titillium Web"/>
-                <a:cs typeface="Titillium Web"/>
-                <a:sym typeface="Titillium Web"/>
-              </a:defRPr>
-            </a:lvl3pPr>
-            <a:lvl4pPr marR="0" lvl="3" algn="l" rtl="0">
-              <a:lnSpc>
-                <a:spcPct val="100000"/>
-              </a:lnSpc>
-              <a:spcBef>
-                <a:spcPts val="0"/>
-              </a:spcBef>
-              <a:spcAft>
-                <a:spcPts val="0"/>
-              </a:spcAft>
-              <a:buClr>
-                <a:schemeClr val="lt1"/>
-              </a:buClr>
-              <a:buSzPts val="6000"/>
-              <a:buFont typeface="Titillium Web"/>
-              <a:buNone/>
-              <a:defRPr sz="8000" b="1" i="0" u="none" strike="noStrike" cap="none">
-                <a:solidFill>
-                  <a:schemeClr val="lt1"/>
-                </a:solidFill>
-                <a:latin typeface="Titillium Web"/>
-                <a:ea typeface="Titillium Web"/>
-                <a:cs typeface="Titillium Web"/>
-                <a:sym typeface="Titillium Web"/>
-              </a:defRPr>
-            </a:lvl4pPr>
-            <a:lvl5pPr marR="0" lvl="4" algn="l" rtl="0">
-              <a:lnSpc>
-                <a:spcPct val="100000"/>
-              </a:lnSpc>
-              <a:spcBef>
-                <a:spcPts val="0"/>
-              </a:spcBef>
-              <a:spcAft>
-                <a:spcPts val="0"/>
-              </a:spcAft>
-              <a:buClr>
-                <a:schemeClr val="lt1"/>
-              </a:buClr>
-              <a:buSzPts val="6000"/>
-              <a:buFont typeface="Titillium Web"/>
-              <a:buNone/>
-              <a:defRPr sz="8000" b="1" i="0" u="none" strike="noStrike" cap="none">
-                <a:solidFill>
-                  <a:schemeClr val="lt1"/>
-                </a:solidFill>
-                <a:latin typeface="Titillium Web"/>
-                <a:ea typeface="Titillium Web"/>
-                <a:cs typeface="Titillium Web"/>
-                <a:sym typeface="Titillium Web"/>
-              </a:defRPr>
-            </a:lvl5pPr>
-            <a:lvl6pPr marR="0" lvl="5" algn="l" rtl="0">
-              <a:lnSpc>
-                <a:spcPct val="100000"/>
-              </a:lnSpc>
-              <a:spcBef>
-                <a:spcPts val="0"/>
-              </a:spcBef>
-              <a:spcAft>
-                <a:spcPts val="0"/>
-              </a:spcAft>
-              <a:buClr>
-                <a:schemeClr val="lt1"/>
-              </a:buClr>
-              <a:buSzPts val="6000"/>
-              <a:buFont typeface="Titillium Web"/>
-              <a:buNone/>
-              <a:defRPr sz="8000" b="1" i="0" u="none" strike="noStrike" cap="none">
-                <a:solidFill>
-                  <a:schemeClr val="lt1"/>
-                </a:solidFill>
-                <a:latin typeface="Titillium Web"/>
-                <a:ea typeface="Titillium Web"/>
-                <a:cs typeface="Titillium Web"/>
-                <a:sym typeface="Titillium Web"/>
-              </a:defRPr>
-            </a:lvl6pPr>
-            <a:lvl7pPr marR="0" lvl="6" algn="l" rtl="0">
-              <a:lnSpc>
-                <a:spcPct val="100000"/>
-              </a:lnSpc>
-              <a:spcBef>
-                <a:spcPts val="0"/>
-              </a:spcBef>
-              <a:spcAft>
-                <a:spcPts val="0"/>
-              </a:spcAft>
-              <a:buClr>
-                <a:schemeClr val="lt1"/>
-              </a:buClr>
-              <a:buSzPts val="6000"/>
-              <a:buFont typeface="Titillium Web"/>
-              <a:buNone/>
-              <a:defRPr sz="8000" b="1" i="0" u="none" strike="noStrike" cap="none">
-                <a:solidFill>
-                  <a:schemeClr val="lt1"/>
-                </a:solidFill>
-                <a:latin typeface="Titillium Web"/>
-                <a:ea typeface="Titillium Web"/>
-                <a:cs typeface="Titillium Web"/>
-                <a:sym typeface="Titillium Web"/>
-              </a:defRPr>
-            </a:lvl7pPr>
-            <a:lvl8pPr marR="0" lvl="7" algn="l" rtl="0">
-              <a:lnSpc>
-                <a:spcPct val="100000"/>
-              </a:lnSpc>
-              <a:spcBef>
-                <a:spcPts val="0"/>
-              </a:spcBef>
-              <a:spcAft>
-                <a:spcPts val="0"/>
-              </a:spcAft>
-              <a:buClr>
-                <a:schemeClr val="lt1"/>
-              </a:buClr>
-              <a:buSzPts val="6000"/>
-              <a:buFont typeface="Titillium Web"/>
-              <a:buNone/>
-              <a:defRPr sz="8000" b="1" i="0" u="none" strike="noStrike" cap="none">
-                <a:solidFill>
-                  <a:schemeClr val="lt1"/>
-                </a:solidFill>
-                <a:latin typeface="Titillium Web"/>
-                <a:ea typeface="Titillium Web"/>
-                <a:cs typeface="Titillium Web"/>
-                <a:sym typeface="Titillium Web"/>
-              </a:defRPr>
-            </a:lvl8pPr>
-            <a:lvl9pPr marR="0" lvl="8" algn="l" rtl="0">
-              <a:lnSpc>
-                <a:spcPct val="100000"/>
-              </a:lnSpc>
-              <a:spcBef>
-                <a:spcPts val="0"/>
-              </a:spcBef>
-              <a:spcAft>
-                <a:spcPts val="0"/>
-              </a:spcAft>
-              <a:buClr>
-                <a:schemeClr val="lt1"/>
-              </a:buClr>
-              <a:buSzPts val="6000"/>
-              <a:buFont typeface="Titillium Web"/>
-              <a:buNone/>
-              <a:defRPr sz="8000" b="1" i="0" u="none" strike="noStrike" cap="none">
-                <a:solidFill>
-                  <a:schemeClr val="lt1"/>
-                </a:solidFill>
-                <a:latin typeface="Titillium Web"/>
-                <a:ea typeface="Titillium Web"/>
-                <a:cs typeface="Titillium Web"/>
-                <a:sym typeface="Titillium Web"/>
-              </a:defRPr>
-            </a:lvl9pPr>
-          </a:lstStyle>
+          <a:bodyPr rtlCol="0" anchor="ctr"/>
+          <a:lstStyle/>
           <a:p>
             <a:pPr algn="ctr"/>
-            <a:r>
-              <a:rPr lang="es-MX" sz="2000" b="0" dirty="0"/>
-              <a:t>24</a:t>
-            </a:r>
+            <a:endParaRPr lang="es-VE" dirty="0">
+              <a:solidFill>
+                <a:schemeClr val="bg1"/>
+              </a:solidFill>
+              <a:latin typeface="Segoe UI" panose="020B0502040204020203" pitchFamily="34" charset="0"/>
+              <a:cs typeface="Segoe UI" panose="020B0502040204020203" pitchFamily="34" charset="0"/>
+            </a:endParaRPr>
+          </a:p>
+        </p:txBody>
+      </p:sp>
+      <p:sp>
+        <p:nvSpPr>
+          <p:cNvPr id="4" name="Rectángulo 3">
+            <a:extLst>
+              <a:ext uri="{FF2B5EF4-FFF2-40B4-BE49-F238E27FC236}">
+                <a16:creationId xmlns:a16="http://schemas.microsoft.com/office/drawing/2014/main" id="{CEDB4F45-20DC-F1B7-6560-43F1EAEEE3BA}"/>
+              </a:ext>
+            </a:extLst>
+          </p:cNvPr>
+          <p:cNvSpPr/>
+          <p:nvPr/>
+        </p:nvSpPr>
+        <p:spPr>
+          <a:xfrm>
+            <a:off x="3008485" y="332337"/>
+            <a:ext cx="307101" cy="307100"/>
+          </a:xfrm>
+          <a:prstGeom prst="rect">
+            <a:avLst/>
+          </a:prstGeom>
+          <a:solidFill>
+            <a:srgbClr val="00BE4C"/>
+          </a:solidFill>
+        </p:spPr>
+        <p:style>
+          <a:lnRef idx="2">
+            <a:schemeClr val="accent1">
+              <a:shade val="15000"/>
+            </a:schemeClr>
+          </a:lnRef>
+          <a:fillRef idx="1">
+            <a:schemeClr val="accent1"/>
+          </a:fillRef>
+          <a:effectRef idx="0">
+            <a:schemeClr val="accent1"/>
+          </a:effectRef>
+          <a:fontRef idx="minor">
+            <a:schemeClr val="lt1"/>
+          </a:fontRef>
+        </p:style>
+        <p:txBody>
+          <a:bodyPr rtlCol="0" anchor="ctr"/>
+          <a:lstStyle/>
+          <a:p>
+            <a:pPr algn="ctr"/>
+            <a:endParaRPr lang="es-VE" dirty="0">
+              <a:solidFill>
+                <a:schemeClr val="bg1"/>
+              </a:solidFill>
+              <a:latin typeface="Segoe UI" panose="020B0502040204020203" pitchFamily="34" charset="0"/>
+              <a:cs typeface="Segoe UI" panose="020B0502040204020203" pitchFamily="34" charset="0"/>
+            </a:endParaRPr>
+          </a:p>
+        </p:txBody>
+      </p:sp>
+      <p:sp>
+        <p:nvSpPr>
+          <p:cNvPr id="5" name="Rectángulo 4">
+            <a:extLst>
+              <a:ext uri="{FF2B5EF4-FFF2-40B4-BE49-F238E27FC236}">
+                <a16:creationId xmlns:a16="http://schemas.microsoft.com/office/drawing/2014/main" id="{34CB77EB-7EC2-2541-A2C9-872D6D72C748}"/>
+              </a:ext>
+            </a:extLst>
+          </p:cNvPr>
+          <p:cNvSpPr>
+            <a:spLocks noChangeAspect="1"/>
+          </p:cNvSpPr>
+          <p:nvPr/>
+        </p:nvSpPr>
+        <p:spPr>
+          <a:xfrm>
+            <a:off x="2768404" y="755535"/>
+            <a:ext cx="288000" cy="288000"/>
+          </a:xfrm>
+          <a:prstGeom prst="rect">
+            <a:avLst/>
+          </a:prstGeom>
+          <a:solidFill>
+            <a:srgbClr val="00B0F0"/>
+          </a:solidFill>
+        </p:spPr>
+        <p:style>
+          <a:lnRef idx="2">
+            <a:schemeClr val="accent1">
+              <a:shade val="15000"/>
+            </a:schemeClr>
+          </a:lnRef>
+          <a:fillRef idx="1">
+            <a:schemeClr val="accent1"/>
+          </a:fillRef>
+          <a:effectRef idx="0">
+            <a:schemeClr val="accent1"/>
+          </a:effectRef>
+          <a:fontRef idx="minor">
+            <a:schemeClr val="lt1"/>
+          </a:fontRef>
+        </p:style>
+        <p:txBody>
+          <a:bodyPr rtlCol="0" anchor="ctr"/>
+          <a:lstStyle/>
+          <a:p>
+            <a:pPr algn="ctr"/>
+            <a:endParaRPr lang="es-VE" dirty="0">
+              <a:solidFill>
+                <a:schemeClr val="bg1"/>
+              </a:solidFill>
+              <a:latin typeface="Segoe UI" panose="020B0502040204020203" pitchFamily="34" charset="0"/>
+              <a:cs typeface="Segoe UI" panose="020B0502040204020203" pitchFamily="34" charset="0"/>
+            </a:endParaRPr>
+          </a:p>
+        </p:txBody>
+      </p:sp>
+      <p:sp>
+        <p:nvSpPr>
+          <p:cNvPr id="6" name="Rectángulo 5">
+            <a:extLst>
+              <a:ext uri="{FF2B5EF4-FFF2-40B4-BE49-F238E27FC236}">
+                <a16:creationId xmlns:a16="http://schemas.microsoft.com/office/drawing/2014/main" id="{2B6EA53B-38F9-F5AD-BB91-477844380FC9}"/>
+              </a:ext>
+            </a:extLst>
+          </p:cNvPr>
+          <p:cNvSpPr/>
+          <p:nvPr/>
+        </p:nvSpPr>
+        <p:spPr>
+          <a:xfrm>
+            <a:off x="3916350" y="328199"/>
+            <a:ext cx="307101" cy="307100"/>
+          </a:xfrm>
+          <a:prstGeom prst="rect">
+            <a:avLst/>
+          </a:prstGeom>
+          <a:solidFill>
+            <a:srgbClr val="00BE4C"/>
+          </a:solidFill>
+        </p:spPr>
+        <p:style>
+          <a:lnRef idx="2">
+            <a:schemeClr val="accent1">
+              <a:shade val="15000"/>
+            </a:schemeClr>
+          </a:lnRef>
+          <a:fillRef idx="1">
+            <a:schemeClr val="accent1"/>
+          </a:fillRef>
+          <a:effectRef idx="0">
+            <a:schemeClr val="accent1"/>
+          </a:effectRef>
+          <a:fontRef idx="minor">
+            <a:schemeClr val="lt1"/>
+          </a:fontRef>
+        </p:style>
+        <p:txBody>
+          <a:bodyPr rtlCol="0" anchor="ctr"/>
+          <a:lstStyle/>
+          <a:p>
+            <a:pPr algn="ctr"/>
+            <a:endParaRPr lang="es-VE" dirty="0">
+              <a:solidFill>
+                <a:schemeClr val="bg1"/>
+              </a:solidFill>
+              <a:latin typeface="Segoe UI" panose="020B0502040204020203" pitchFamily="34" charset="0"/>
+              <a:cs typeface="Segoe UI" panose="020B0502040204020203" pitchFamily="34" charset="0"/>
+            </a:endParaRPr>
+          </a:p>
+        </p:txBody>
+      </p:sp>
+      <p:sp>
+        <p:nvSpPr>
+          <p:cNvPr id="7" name="Rectángulo 6">
+            <a:extLst>
+              <a:ext uri="{FF2B5EF4-FFF2-40B4-BE49-F238E27FC236}">
+                <a16:creationId xmlns:a16="http://schemas.microsoft.com/office/drawing/2014/main" id="{2BD732E5-3A4F-521C-D578-A496780ED141}"/>
+              </a:ext>
+            </a:extLst>
+          </p:cNvPr>
+          <p:cNvSpPr>
+            <a:spLocks noChangeAspect="1"/>
+          </p:cNvSpPr>
+          <p:nvPr/>
+        </p:nvSpPr>
+        <p:spPr>
+          <a:xfrm>
+            <a:off x="3676269" y="751397"/>
+            <a:ext cx="288000" cy="288000"/>
+          </a:xfrm>
+          <a:prstGeom prst="rect">
+            <a:avLst/>
+          </a:prstGeom>
+          <a:solidFill>
+            <a:srgbClr val="00B0F0"/>
+          </a:solidFill>
+        </p:spPr>
+        <p:style>
+          <a:lnRef idx="2">
+            <a:schemeClr val="accent1">
+              <a:shade val="15000"/>
+            </a:schemeClr>
+          </a:lnRef>
+          <a:fillRef idx="1">
+            <a:schemeClr val="accent1"/>
+          </a:fillRef>
+          <a:effectRef idx="0">
+            <a:schemeClr val="accent1"/>
+          </a:effectRef>
+          <a:fontRef idx="minor">
+            <a:schemeClr val="lt1"/>
+          </a:fontRef>
+        </p:style>
+        <p:txBody>
+          <a:bodyPr rtlCol="0" anchor="ctr"/>
+          <a:lstStyle/>
+          <a:p>
+            <a:pPr algn="ctr"/>
+            <a:endParaRPr lang="es-VE" dirty="0">
+              <a:solidFill>
+                <a:schemeClr val="bg1"/>
+              </a:solidFill>
+              <a:latin typeface="Segoe UI" panose="020B0502040204020203" pitchFamily="34" charset="0"/>
+              <a:cs typeface="Segoe UI" panose="020B0502040204020203" pitchFamily="34" charset="0"/>
+            </a:endParaRPr>
+          </a:p>
+        </p:txBody>
+      </p:sp>
+      <p:sp>
+        <p:nvSpPr>
+          <p:cNvPr id="8" name="Rectángulo 7">
+            <a:extLst>
+              <a:ext uri="{FF2B5EF4-FFF2-40B4-BE49-F238E27FC236}">
+                <a16:creationId xmlns:a16="http://schemas.microsoft.com/office/drawing/2014/main" id="{CE803A2B-AB63-D96B-00DF-23F819FBCAF8}"/>
+              </a:ext>
+            </a:extLst>
+          </p:cNvPr>
+          <p:cNvSpPr/>
+          <p:nvPr/>
+        </p:nvSpPr>
+        <p:spPr>
+          <a:xfrm>
+            <a:off x="4811721" y="341790"/>
+            <a:ext cx="307101" cy="307100"/>
+          </a:xfrm>
+          <a:prstGeom prst="rect">
+            <a:avLst/>
+          </a:prstGeom>
+          <a:solidFill>
+            <a:srgbClr val="00BE4C"/>
+          </a:solidFill>
+        </p:spPr>
+        <p:style>
+          <a:lnRef idx="2">
+            <a:schemeClr val="accent1">
+              <a:shade val="15000"/>
+            </a:schemeClr>
+          </a:lnRef>
+          <a:fillRef idx="1">
+            <a:schemeClr val="accent1"/>
+          </a:fillRef>
+          <a:effectRef idx="0">
+            <a:schemeClr val="accent1"/>
+          </a:effectRef>
+          <a:fontRef idx="minor">
+            <a:schemeClr val="lt1"/>
+          </a:fontRef>
+        </p:style>
+        <p:txBody>
+          <a:bodyPr rtlCol="0" anchor="ctr"/>
+          <a:lstStyle/>
+          <a:p>
+            <a:pPr algn="ctr"/>
+            <a:endParaRPr lang="es-VE" dirty="0">
+              <a:solidFill>
+                <a:schemeClr val="bg1"/>
+              </a:solidFill>
+              <a:latin typeface="Segoe UI" panose="020B0502040204020203" pitchFamily="34" charset="0"/>
+              <a:cs typeface="Segoe UI" panose="020B0502040204020203" pitchFamily="34" charset="0"/>
+            </a:endParaRPr>
+          </a:p>
+        </p:txBody>
+      </p:sp>
+      <p:sp>
+        <p:nvSpPr>
+          <p:cNvPr id="9" name="Rectángulo 8">
+            <a:extLst>
+              <a:ext uri="{FF2B5EF4-FFF2-40B4-BE49-F238E27FC236}">
+                <a16:creationId xmlns:a16="http://schemas.microsoft.com/office/drawing/2014/main" id="{D6D642C6-3E09-A926-6928-2ED552211124}"/>
+              </a:ext>
+            </a:extLst>
+          </p:cNvPr>
+          <p:cNvSpPr>
+            <a:spLocks noChangeAspect="1"/>
+          </p:cNvSpPr>
+          <p:nvPr/>
+        </p:nvSpPr>
+        <p:spPr>
+          <a:xfrm>
+            <a:off x="4571640" y="764988"/>
+            <a:ext cx="288000" cy="288000"/>
+          </a:xfrm>
+          <a:prstGeom prst="rect">
+            <a:avLst/>
+          </a:prstGeom>
+          <a:solidFill>
+            <a:srgbClr val="00B0F0"/>
+          </a:solidFill>
+        </p:spPr>
+        <p:style>
+          <a:lnRef idx="2">
+            <a:schemeClr val="accent1">
+              <a:shade val="15000"/>
+            </a:schemeClr>
+          </a:lnRef>
+          <a:fillRef idx="1">
+            <a:schemeClr val="accent1"/>
+          </a:fillRef>
+          <a:effectRef idx="0">
+            <a:schemeClr val="accent1"/>
+          </a:effectRef>
+          <a:fontRef idx="minor">
+            <a:schemeClr val="lt1"/>
+          </a:fontRef>
+        </p:style>
+        <p:txBody>
+          <a:bodyPr rtlCol="0" anchor="ctr"/>
+          <a:lstStyle/>
+          <a:p>
+            <a:pPr algn="ctr"/>
+            <a:endParaRPr lang="es-VE" dirty="0">
+              <a:solidFill>
+                <a:schemeClr val="bg1"/>
+              </a:solidFill>
+              <a:latin typeface="Segoe UI" panose="020B0502040204020203" pitchFamily="34" charset="0"/>
+              <a:cs typeface="Segoe UI" panose="020B0502040204020203" pitchFamily="34" charset="0"/>
+            </a:endParaRPr>
+          </a:p>
+        </p:txBody>
+      </p:sp>
+      <p:sp>
+        <p:nvSpPr>
+          <p:cNvPr id="10" name="Rectángulo 9">
+            <a:extLst>
+              <a:ext uri="{FF2B5EF4-FFF2-40B4-BE49-F238E27FC236}">
+                <a16:creationId xmlns:a16="http://schemas.microsoft.com/office/drawing/2014/main" id="{E81265B7-871A-8484-9DB7-0E17E7D2FA24}"/>
+              </a:ext>
+            </a:extLst>
+          </p:cNvPr>
+          <p:cNvSpPr/>
+          <p:nvPr/>
+        </p:nvSpPr>
+        <p:spPr>
+          <a:xfrm>
+            <a:off x="5707092" y="341790"/>
+            <a:ext cx="307101" cy="307100"/>
+          </a:xfrm>
+          <a:prstGeom prst="rect">
+            <a:avLst/>
+          </a:prstGeom>
+          <a:solidFill>
+            <a:srgbClr val="00BE4C"/>
+          </a:solidFill>
+        </p:spPr>
+        <p:style>
+          <a:lnRef idx="2">
+            <a:schemeClr val="accent1">
+              <a:shade val="15000"/>
+            </a:schemeClr>
+          </a:lnRef>
+          <a:fillRef idx="1">
+            <a:schemeClr val="accent1"/>
+          </a:fillRef>
+          <a:effectRef idx="0">
+            <a:schemeClr val="accent1"/>
+          </a:effectRef>
+          <a:fontRef idx="minor">
+            <a:schemeClr val="lt1"/>
+          </a:fontRef>
+        </p:style>
+        <p:txBody>
+          <a:bodyPr rtlCol="0" anchor="ctr"/>
+          <a:lstStyle/>
+          <a:p>
+            <a:pPr algn="ctr"/>
+            <a:endParaRPr lang="es-VE" dirty="0">
+              <a:solidFill>
+                <a:schemeClr val="bg1"/>
+              </a:solidFill>
+              <a:latin typeface="Segoe UI" panose="020B0502040204020203" pitchFamily="34" charset="0"/>
+              <a:cs typeface="Segoe UI" panose="020B0502040204020203" pitchFamily="34" charset="0"/>
+            </a:endParaRPr>
+          </a:p>
+        </p:txBody>
+      </p:sp>
+      <p:sp>
+        <p:nvSpPr>
+          <p:cNvPr id="11" name="Rectángulo 10">
+            <a:extLst>
+              <a:ext uri="{FF2B5EF4-FFF2-40B4-BE49-F238E27FC236}">
+                <a16:creationId xmlns:a16="http://schemas.microsoft.com/office/drawing/2014/main" id="{A925AA3F-C282-401F-7D78-EFCBF4C226AE}"/>
+              </a:ext>
+            </a:extLst>
+          </p:cNvPr>
+          <p:cNvSpPr>
+            <a:spLocks noChangeAspect="1"/>
+          </p:cNvSpPr>
+          <p:nvPr/>
+        </p:nvSpPr>
+        <p:spPr>
+          <a:xfrm>
+            <a:off x="5467011" y="764988"/>
+            <a:ext cx="288000" cy="288000"/>
+          </a:xfrm>
+          <a:prstGeom prst="rect">
+            <a:avLst/>
+          </a:prstGeom>
+          <a:solidFill>
+            <a:srgbClr val="00B0F0"/>
+          </a:solidFill>
+        </p:spPr>
+        <p:style>
+          <a:lnRef idx="2">
+            <a:schemeClr val="accent1">
+              <a:shade val="15000"/>
+            </a:schemeClr>
+          </a:lnRef>
+          <a:fillRef idx="1">
+            <a:schemeClr val="accent1"/>
+          </a:fillRef>
+          <a:effectRef idx="0">
+            <a:schemeClr val="accent1"/>
+          </a:effectRef>
+          <a:fontRef idx="minor">
+            <a:schemeClr val="lt1"/>
+          </a:fontRef>
+        </p:style>
+        <p:txBody>
+          <a:bodyPr rtlCol="0" anchor="ctr"/>
+          <a:lstStyle/>
+          <a:p>
+            <a:pPr algn="ctr"/>
+            <a:endParaRPr lang="es-VE" dirty="0">
+              <a:solidFill>
+                <a:schemeClr val="bg1"/>
+              </a:solidFill>
+              <a:latin typeface="Segoe UI" panose="020B0502040204020203" pitchFamily="34" charset="0"/>
+              <a:cs typeface="Segoe UI" panose="020B0502040204020203" pitchFamily="34" charset="0"/>
+            </a:endParaRPr>
           </a:p>
         </p:txBody>
       </p:sp>
@@ -38771,7 +38453,7 @@
         </p:nvSpPr>
         <p:spPr>
           <a:xfrm>
-            <a:off x="1072150" y="2227961"/>
+            <a:off x="1072150" y="2247839"/>
             <a:ext cx="360000" cy="360000"/>
           </a:xfrm>
           <a:prstGeom prst="rect">
@@ -41484,7 +41166,7 @@
         </p:nvSpPr>
         <p:spPr>
           <a:xfrm>
-            <a:off x="1072150" y="2227961"/>
+            <a:off x="1072150" y="2247839"/>
             <a:ext cx="360000" cy="360000"/>
           </a:xfrm>
           <a:prstGeom prst="rect">
@@ -44254,7 +43936,7 @@
         </p:nvSpPr>
         <p:spPr>
           <a:xfrm>
-            <a:off x="1072150" y="2227961"/>
+            <a:off x="1072150" y="2247839"/>
             <a:ext cx="360000" cy="360000"/>
           </a:xfrm>
           <a:prstGeom prst="rect">
@@ -46109,6 +45791,673 @@
         <p:cNvPr id="1" name="Shape 53">
           <a:extLst>
             <a:ext uri="{FF2B5EF4-FFF2-40B4-BE49-F238E27FC236}">
+              <a16:creationId xmlns:a16="http://schemas.microsoft.com/office/drawing/2014/main" id="{E99267E0-49F6-F6E9-C525-B88AEFB4151F}"/>
+            </a:ext>
+          </a:extLst>
+        </p:cNvPr>
+        <p:cNvGrpSpPr/>
+        <p:nvPr/>
+      </p:nvGrpSpPr>
+      <p:grpSpPr>
+        <a:xfrm>
+          <a:off x="0" y="0"/>
+          <a:ext cx="0" cy="0"/>
+          <a:chOff x="0" y="0"/>
+          <a:chExt cx="0" cy="0"/>
+        </a:xfrm>
+      </p:grpSpPr>
+      <p:sp>
+        <p:nvSpPr>
+          <p:cNvPr id="8" name="Google Shape;75;p14">
+            <a:extLst>
+              <a:ext uri="{FF2B5EF4-FFF2-40B4-BE49-F238E27FC236}">
+                <a16:creationId xmlns:a16="http://schemas.microsoft.com/office/drawing/2014/main" id="{6687CB3B-DE3B-C63B-F22C-E823F5B52E31}"/>
+              </a:ext>
+            </a:extLst>
+          </p:cNvPr>
+          <p:cNvSpPr txBox="1">
+            <a:spLocks noGrp="1"/>
+          </p:cNvSpPr>
+          <p:nvPr>
+            <p:ph type="ctrTitle"/>
+          </p:nvPr>
+        </p:nvSpPr>
+        <p:spPr>
+          <a:xfrm>
+            <a:off x="328948" y="518504"/>
+            <a:ext cx="8657617" cy="2156067"/>
+          </a:xfrm>
+          <a:prstGeom prst="rect">
+            <a:avLst/>
+          </a:prstGeom>
+        </p:spPr>
+        <p:txBody>
+          <a:bodyPr spcFirstLastPara="1" wrap="square" lIns="0" tIns="0" rIns="0" bIns="0" anchor="b" anchorCtr="0">
+            <a:noAutofit/>
+          </a:bodyPr>
+          <a:lstStyle/>
+          <a:p>
+            <a:r>
+              <a:rPr lang="es-ES" dirty="0"/>
+              <a:t>DISTRIBUCIÓN DEL CABLEADO</a:t>
+            </a:r>
+            <a:endParaRPr dirty="0"/>
+          </a:p>
+        </p:txBody>
+      </p:sp>
+      <p:sp>
+        <p:nvSpPr>
+          <p:cNvPr id="4" name="Google Shape;60;p12">
+            <a:extLst>
+              <a:ext uri="{FF2B5EF4-FFF2-40B4-BE49-F238E27FC236}">
+                <a16:creationId xmlns:a16="http://schemas.microsoft.com/office/drawing/2014/main" id="{A34533CF-938B-0F34-4AD0-B3A3EFF35656}"/>
+              </a:ext>
+            </a:extLst>
+          </p:cNvPr>
+          <p:cNvSpPr txBox="1">
+            <a:spLocks/>
+          </p:cNvSpPr>
+          <p:nvPr/>
+        </p:nvSpPr>
+        <p:spPr>
+          <a:xfrm>
+            <a:off x="428990" y="3075966"/>
+            <a:ext cx="6886210" cy="706067"/>
+          </a:xfrm>
+          <a:prstGeom prst="rect">
+            <a:avLst/>
+          </a:prstGeom>
+        </p:spPr>
+        <p:txBody>
+          <a:bodyPr spcFirstLastPara="1" wrap="square" lIns="0" tIns="0" rIns="0" bIns="0" anchor="ctr" anchorCtr="0">
+            <a:noAutofit/>
+          </a:bodyPr>
+          <a:lstStyle>
+            <a:defPPr marR="0" lvl="0" algn="l" rtl="0">
+              <a:lnSpc>
+                <a:spcPct val="100000"/>
+              </a:lnSpc>
+              <a:spcBef>
+                <a:spcPts val="0"/>
+              </a:spcBef>
+              <a:spcAft>
+                <a:spcPts val="0"/>
+              </a:spcAft>
+            </a:defPPr>
+            <a:lvl1pPr marR="0" lvl="0" algn="l" rtl="0">
+              <a:lnSpc>
+                <a:spcPct val="100000"/>
+              </a:lnSpc>
+              <a:spcBef>
+                <a:spcPts val="0"/>
+              </a:spcBef>
+              <a:spcAft>
+                <a:spcPts val="0"/>
+              </a:spcAft>
+              <a:buClr>
+                <a:srgbClr val="000000"/>
+              </a:buClr>
+              <a:buFont typeface="Arial"/>
+              <a:defRPr sz="1867" b="0" i="0" u="none" strike="noStrike" cap="none">
+                <a:solidFill>
+                  <a:srgbClr val="000000"/>
+                </a:solidFill>
+                <a:latin typeface="Arial"/>
+                <a:ea typeface="Arial"/>
+                <a:cs typeface="Arial"/>
+                <a:sym typeface="Arial"/>
+              </a:defRPr>
+            </a:lvl1pPr>
+            <a:lvl2pPr marR="0" lvl="1" algn="l" rtl="0">
+              <a:lnSpc>
+                <a:spcPct val="100000"/>
+              </a:lnSpc>
+              <a:spcBef>
+                <a:spcPts val="0"/>
+              </a:spcBef>
+              <a:spcAft>
+                <a:spcPts val="0"/>
+              </a:spcAft>
+              <a:buClr>
+                <a:srgbClr val="000000"/>
+              </a:buClr>
+              <a:buFont typeface="Arial"/>
+              <a:defRPr sz="1867" b="0" i="0" u="none" strike="noStrike" cap="none">
+                <a:solidFill>
+                  <a:srgbClr val="000000"/>
+                </a:solidFill>
+                <a:latin typeface="Arial"/>
+                <a:ea typeface="Arial"/>
+                <a:cs typeface="Arial"/>
+                <a:sym typeface="Arial"/>
+              </a:defRPr>
+            </a:lvl2pPr>
+            <a:lvl3pPr marR="0" lvl="2" algn="l" rtl="0">
+              <a:lnSpc>
+                <a:spcPct val="100000"/>
+              </a:lnSpc>
+              <a:spcBef>
+                <a:spcPts val="0"/>
+              </a:spcBef>
+              <a:spcAft>
+                <a:spcPts val="0"/>
+              </a:spcAft>
+              <a:buClr>
+                <a:srgbClr val="000000"/>
+              </a:buClr>
+              <a:buFont typeface="Arial"/>
+              <a:defRPr sz="1867" b="0" i="0" u="none" strike="noStrike" cap="none">
+                <a:solidFill>
+                  <a:srgbClr val="000000"/>
+                </a:solidFill>
+                <a:latin typeface="Arial"/>
+                <a:ea typeface="Arial"/>
+                <a:cs typeface="Arial"/>
+                <a:sym typeface="Arial"/>
+              </a:defRPr>
+            </a:lvl3pPr>
+            <a:lvl4pPr marR="0" lvl="3" algn="l" rtl="0">
+              <a:lnSpc>
+                <a:spcPct val="100000"/>
+              </a:lnSpc>
+              <a:spcBef>
+                <a:spcPts val="0"/>
+              </a:spcBef>
+              <a:spcAft>
+                <a:spcPts val="0"/>
+              </a:spcAft>
+              <a:buClr>
+                <a:srgbClr val="000000"/>
+              </a:buClr>
+              <a:buFont typeface="Arial"/>
+              <a:defRPr sz="1867" b="0" i="0" u="none" strike="noStrike" cap="none">
+                <a:solidFill>
+                  <a:srgbClr val="000000"/>
+                </a:solidFill>
+                <a:latin typeface="Arial"/>
+                <a:ea typeface="Arial"/>
+                <a:cs typeface="Arial"/>
+                <a:sym typeface="Arial"/>
+              </a:defRPr>
+            </a:lvl4pPr>
+            <a:lvl5pPr marR="0" lvl="4" algn="l" rtl="0">
+              <a:lnSpc>
+                <a:spcPct val="100000"/>
+              </a:lnSpc>
+              <a:spcBef>
+                <a:spcPts val="0"/>
+              </a:spcBef>
+              <a:spcAft>
+                <a:spcPts val="0"/>
+              </a:spcAft>
+              <a:buClr>
+                <a:srgbClr val="000000"/>
+              </a:buClr>
+              <a:buFont typeface="Arial"/>
+              <a:defRPr sz="1867" b="0" i="0" u="none" strike="noStrike" cap="none">
+                <a:solidFill>
+                  <a:srgbClr val="000000"/>
+                </a:solidFill>
+                <a:latin typeface="Arial"/>
+                <a:ea typeface="Arial"/>
+                <a:cs typeface="Arial"/>
+                <a:sym typeface="Arial"/>
+              </a:defRPr>
+            </a:lvl5pPr>
+            <a:lvl6pPr marR="0" lvl="5" algn="l" rtl="0">
+              <a:lnSpc>
+                <a:spcPct val="100000"/>
+              </a:lnSpc>
+              <a:spcBef>
+                <a:spcPts val="0"/>
+              </a:spcBef>
+              <a:spcAft>
+                <a:spcPts val="0"/>
+              </a:spcAft>
+              <a:buClr>
+                <a:srgbClr val="000000"/>
+              </a:buClr>
+              <a:buFont typeface="Arial"/>
+              <a:defRPr sz="1867" b="0" i="0" u="none" strike="noStrike" cap="none">
+                <a:solidFill>
+                  <a:srgbClr val="000000"/>
+                </a:solidFill>
+                <a:latin typeface="Arial"/>
+                <a:ea typeface="Arial"/>
+                <a:cs typeface="Arial"/>
+                <a:sym typeface="Arial"/>
+              </a:defRPr>
+            </a:lvl6pPr>
+            <a:lvl7pPr marR="0" lvl="6" algn="l" rtl="0">
+              <a:lnSpc>
+                <a:spcPct val="100000"/>
+              </a:lnSpc>
+              <a:spcBef>
+                <a:spcPts val="0"/>
+              </a:spcBef>
+              <a:spcAft>
+                <a:spcPts val="0"/>
+              </a:spcAft>
+              <a:buClr>
+                <a:srgbClr val="000000"/>
+              </a:buClr>
+              <a:buFont typeface="Arial"/>
+              <a:defRPr sz="1867" b="0" i="0" u="none" strike="noStrike" cap="none">
+                <a:solidFill>
+                  <a:srgbClr val="000000"/>
+                </a:solidFill>
+                <a:latin typeface="Arial"/>
+                <a:ea typeface="Arial"/>
+                <a:cs typeface="Arial"/>
+                <a:sym typeface="Arial"/>
+              </a:defRPr>
+            </a:lvl7pPr>
+            <a:lvl8pPr marR="0" lvl="7" algn="l" rtl="0">
+              <a:lnSpc>
+                <a:spcPct val="100000"/>
+              </a:lnSpc>
+              <a:spcBef>
+                <a:spcPts val="0"/>
+              </a:spcBef>
+              <a:spcAft>
+                <a:spcPts val="0"/>
+              </a:spcAft>
+              <a:buClr>
+                <a:srgbClr val="000000"/>
+              </a:buClr>
+              <a:buFont typeface="Arial"/>
+              <a:defRPr sz="1867" b="0" i="0" u="none" strike="noStrike" cap="none">
+                <a:solidFill>
+                  <a:srgbClr val="000000"/>
+                </a:solidFill>
+                <a:latin typeface="Arial"/>
+                <a:ea typeface="Arial"/>
+                <a:cs typeface="Arial"/>
+                <a:sym typeface="Arial"/>
+              </a:defRPr>
+            </a:lvl8pPr>
+            <a:lvl9pPr marR="0" lvl="8" algn="l" rtl="0">
+              <a:lnSpc>
+                <a:spcPct val="100000"/>
+              </a:lnSpc>
+              <a:spcBef>
+                <a:spcPts val="0"/>
+              </a:spcBef>
+              <a:spcAft>
+                <a:spcPts val="0"/>
+              </a:spcAft>
+              <a:buClr>
+                <a:srgbClr val="000000"/>
+              </a:buClr>
+              <a:buFont typeface="Arial"/>
+              <a:defRPr sz="1867" b="0" i="0" u="none" strike="noStrike" cap="none">
+                <a:solidFill>
+                  <a:srgbClr val="000000"/>
+                </a:solidFill>
+                <a:latin typeface="Arial"/>
+                <a:ea typeface="Arial"/>
+                <a:cs typeface="Arial"/>
+                <a:sym typeface="Arial"/>
+              </a:defRPr>
+            </a:lvl9pPr>
+          </a:lstStyle>
+          <a:p>
+            <a:pPr>
+              <a:lnSpc>
+                <a:spcPct val="150000"/>
+              </a:lnSpc>
+            </a:pPr>
+            <a:r>
+              <a:rPr lang="es-ES" sz="2000" b="1" dirty="0">
+                <a:solidFill>
+                  <a:schemeClr val="bg1"/>
+                </a:solidFill>
+                <a:latin typeface="Titillium Web Light" panose="020F0502020204030204" pitchFamily="2" charset="0"/>
+              </a:rPr>
+              <a:t>El cómo irá el cableado de la red LAN repartido por el edificio.</a:t>
+            </a:r>
+            <a:endParaRPr lang="en-US" sz="2000" b="1" dirty="0"/>
+          </a:p>
+        </p:txBody>
+      </p:sp>
+      <p:pic>
+        <p:nvPicPr>
+          <p:cNvPr id="7" name="Imagen 6">
+            <a:extLst>
+              <a:ext uri="{FF2B5EF4-FFF2-40B4-BE49-F238E27FC236}">
+                <a16:creationId xmlns:a16="http://schemas.microsoft.com/office/drawing/2014/main" id="{17A6FD35-46E4-6434-1997-81B6B183ABBE}"/>
+              </a:ext>
+            </a:extLst>
+          </p:cNvPr>
+          <p:cNvPicPr>
+            <a:picLocks noChangeAspect="1"/>
+          </p:cNvPicPr>
+          <p:nvPr/>
+        </p:nvPicPr>
+        <p:blipFill>
+          <a:blip r:embed="rId3"/>
+          <a:stretch>
+            <a:fillRect/>
+          </a:stretch>
+        </p:blipFill>
+        <p:spPr>
+          <a:xfrm>
+            <a:off x="4572000" y="4388850"/>
+            <a:ext cx="3850120" cy="2156067"/>
+          </a:xfrm>
+          <a:prstGeom prst="rect">
+            <a:avLst/>
+          </a:prstGeom>
+        </p:spPr>
+      </p:pic>
+      <p:sp>
+        <p:nvSpPr>
+          <p:cNvPr id="9" name="Google Shape;54;p11">
+            <a:extLst>
+              <a:ext uri="{FF2B5EF4-FFF2-40B4-BE49-F238E27FC236}">
+                <a16:creationId xmlns:a16="http://schemas.microsoft.com/office/drawing/2014/main" id="{233D81EB-313F-E195-FF60-5047D30608E7}"/>
+              </a:ext>
+            </a:extLst>
+          </p:cNvPr>
+          <p:cNvSpPr txBox="1">
+            <a:spLocks/>
+          </p:cNvSpPr>
+          <p:nvPr/>
+        </p:nvSpPr>
+        <p:spPr>
+          <a:xfrm>
+            <a:off x="8585200" y="6516159"/>
+            <a:ext cx="558800" cy="341841"/>
+          </a:xfrm>
+          <a:prstGeom prst="rect">
+            <a:avLst/>
+          </a:prstGeom>
+          <a:noFill/>
+          <a:ln>
+            <a:noFill/>
+          </a:ln>
+        </p:spPr>
+        <p:txBody>
+          <a:bodyPr spcFirstLastPara="1" wrap="square" lIns="0" tIns="0" rIns="0" bIns="0" anchor="t" anchorCtr="0">
+            <a:noAutofit/>
+          </a:bodyPr>
+          <a:lstStyle>
+            <a:defPPr marR="0" lvl="0" algn="l" rtl="0">
+              <a:lnSpc>
+                <a:spcPct val="100000"/>
+              </a:lnSpc>
+              <a:spcBef>
+                <a:spcPts val="0"/>
+              </a:spcBef>
+              <a:spcAft>
+                <a:spcPts val="0"/>
+              </a:spcAft>
+            </a:defPPr>
+            <a:lvl1pPr marR="0" lvl="0" algn="l" rtl="0">
+              <a:lnSpc>
+                <a:spcPct val="100000"/>
+              </a:lnSpc>
+              <a:spcBef>
+                <a:spcPts val="0"/>
+              </a:spcBef>
+              <a:spcAft>
+                <a:spcPts val="0"/>
+              </a:spcAft>
+              <a:buClr>
+                <a:schemeClr val="lt1"/>
+              </a:buClr>
+              <a:buSzPts val="6000"/>
+              <a:buFont typeface="Titillium Web"/>
+              <a:buNone/>
+              <a:defRPr sz="8000" b="1" i="0" u="none" strike="noStrike" cap="none">
+                <a:solidFill>
+                  <a:schemeClr val="lt1"/>
+                </a:solidFill>
+                <a:latin typeface="Titillium Web"/>
+                <a:ea typeface="Titillium Web"/>
+                <a:cs typeface="Titillium Web"/>
+                <a:sym typeface="Titillium Web"/>
+              </a:defRPr>
+            </a:lvl1pPr>
+            <a:lvl2pPr marR="0" lvl="1" algn="l" rtl="0">
+              <a:lnSpc>
+                <a:spcPct val="100000"/>
+              </a:lnSpc>
+              <a:spcBef>
+                <a:spcPts val="0"/>
+              </a:spcBef>
+              <a:spcAft>
+                <a:spcPts val="0"/>
+              </a:spcAft>
+              <a:buClr>
+                <a:schemeClr val="lt1"/>
+              </a:buClr>
+              <a:buSzPts val="6000"/>
+              <a:buFont typeface="Titillium Web"/>
+              <a:buNone/>
+              <a:defRPr sz="8000" b="1" i="0" u="none" strike="noStrike" cap="none">
+                <a:solidFill>
+                  <a:schemeClr val="lt1"/>
+                </a:solidFill>
+                <a:latin typeface="Titillium Web"/>
+                <a:ea typeface="Titillium Web"/>
+                <a:cs typeface="Titillium Web"/>
+                <a:sym typeface="Titillium Web"/>
+              </a:defRPr>
+            </a:lvl2pPr>
+            <a:lvl3pPr marR="0" lvl="2" algn="l" rtl="0">
+              <a:lnSpc>
+                <a:spcPct val="100000"/>
+              </a:lnSpc>
+              <a:spcBef>
+                <a:spcPts val="0"/>
+              </a:spcBef>
+              <a:spcAft>
+                <a:spcPts val="0"/>
+              </a:spcAft>
+              <a:buClr>
+                <a:schemeClr val="lt1"/>
+              </a:buClr>
+              <a:buSzPts val="6000"/>
+              <a:buFont typeface="Titillium Web"/>
+              <a:buNone/>
+              <a:defRPr sz="8000" b="1" i="0" u="none" strike="noStrike" cap="none">
+                <a:solidFill>
+                  <a:schemeClr val="lt1"/>
+                </a:solidFill>
+                <a:latin typeface="Titillium Web"/>
+                <a:ea typeface="Titillium Web"/>
+                <a:cs typeface="Titillium Web"/>
+                <a:sym typeface="Titillium Web"/>
+              </a:defRPr>
+            </a:lvl3pPr>
+            <a:lvl4pPr marR="0" lvl="3" algn="l" rtl="0">
+              <a:lnSpc>
+                <a:spcPct val="100000"/>
+              </a:lnSpc>
+              <a:spcBef>
+                <a:spcPts val="0"/>
+              </a:spcBef>
+              <a:spcAft>
+                <a:spcPts val="0"/>
+              </a:spcAft>
+              <a:buClr>
+                <a:schemeClr val="lt1"/>
+              </a:buClr>
+              <a:buSzPts val="6000"/>
+              <a:buFont typeface="Titillium Web"/>
+              <a:buNone/>
+              <a:defRPr sz="8000" b="1" i="0" u="none" strike="noStrike" cap="none">
+                <a:solidFill>
+                  <a:schemeClr val="lt1"/>
+                </a:solidFill>
+                <a:latin typeface="Titillium Web"/>
+                <a:ea typeface="Titillium Web"/>
+                <a:cs typeface="Titillium Web"/>
+                <a:sym typeface="Titillium Web"/>
+              </a:defRPr>
+            </a:lvl4pPr>
+            <a:lvl5pPr marR="0" lvl="4" algn="l" rtl="0">
+              <a:lnSpc>
+                <a:spcPct val="100000"/>
+              </a:lnSpc>
+              <a:spcBef>
+                <a:spcPts val="0"/>
+              </a:spcBef>
+              <a:spcAft>
+                <a:spcPts val="0"/>
+              </a:spcAft>
+              <a:buClr>
+                <a:schemeClr val="lt1"/>
+              </a:buClr>
+              <a:buSzPts val="6000"/>
+              <a:buFont typeface="Titillium Web"/>
+              <a:buNone/>
+              <a:defRPr sz="8000" b="1" i="0" u="none" strike="noStrike" cap="none">
+                <a:solidFill>
+                  <a:schemeClr val="lt1"/>
+                </a:solidFill>
+                <a:latin typeface="Titillium Web"/>
+                <a:ea typeface="Titillium Web"/>
+                <a:cs typeface="Titillium Web"/>
+                <a:sym typeface="Titillium Web"/>
+              </a:defRPr>
+            </a:lvl5pPr>
+            <a:lvl6pPr marR="0" lvl="5" algn="l" rtl="0">
+              <a:lnSpc>
+                <a:spcPct val="100000"/>
+              </a:lnSpc>
+              <a:spcBef>
+                <a:spcPts val="0"/>
+              </a:spcBef>
+              <a:spcAft>
+                <a:spcPts val="0"/>
+              </a:spcAft>
+              <a:buClr>
+                <a:schemeClr val="lt1"/>
+              </a:buClr>
+              <a:buSzPts val="6000"/>
+              <a:buFont typeface="Titillium Web"/>
+              <a:buNone/>
+              <a:defRPr sz="8000" b="1" i="0" u="none" strike="noStrike" cap="none">
+                <a:solidFill>
+                  <a:schemeClr val="lt1"/>
+                </a:solidFill>
+                <a:latin typeface="Titillium Web"/>
+                <a:ea typeface="Titillium Web"/>
+                <a:cs typeface="Titillium Web"/>
+                <a:sym typeface="Titillium Web"/>
+              </a:defRPr>
+            </a:lvl6pPr>
+            <a:lvl7pPr marR="0" lvl="6" algn="l" rtl="0">
+              <a:lnSpc>
+                <a:spcPct val="100000"/>
+              </a:lnSpc>
+              <a:spcBef>
+                <a:spcPts val="0"/>
+              </a:spcBef>
+              <a:spcAft>
+                <a:spcPts val="0"/>
+              </a:spcAft>
+              <a:buClr>
+                <a:schemeClr val="lt1"/>
+              </a:buClr>
+              <a:buSzPts val="6000"/>
+              <a:buFont typeface="Titillium Web"/>
+              <a:buNone/>
+              <a:defRPr sz="8000" b="1" i="0" u="none" strike="noStrike" cap="none">
+                <a:solidFill>
+                  <a:schemeClr val="lt1"/>
+                </a:solidFill>
+                <a:latin typeface="Titillium Web"/>
+                <a:ea typeface="Titillium Web"/>
+                <a:cs typeface="Titillium Web"/>
+                <a:sym typeface="Titillium Web"/>
+              </a:defRPr>
+            </a:lvl7pPr>
+            <a:lvl8pPr marR="0" lvl="7" algn="l" rtl="0">
+              <a:lnSpc>
+                <a:spcPct val="100000"/>
+              </a:lnSpc>
+              <a:spcBef>
+                <a:spcPts val="0"/>
+              </a:spcBef>
+              <a:spcAft>
+                <a:spcPts val="0"/>
+              </a:spcAft>
+              <a:buClr>
+                <a:schemeClr val="lt1"/>
+              </a:buClr>
+              <a:buSzPts val="6000"/>
+              <a:buFont typeface="Titillium Web"/>
+              <a:buNone/>
+              <a:defRPr sz="8000" b="1" i="0" u="none" strike="noStrike" cap="none">
+                <a:solidFill>
+                  <a:schemeClr val="lt1"/>
+                </a:solidFill>
+                <a:latin typeface="Titillium Web"/>
+                <a:ea typeface="Titillium Web"/>
+                <a:cs typeface="Titillium Web"/>
+                <a:sym typeface="Titillium Web"/>
+              </a:defRPr>
+            </a:lvl8pPr>
+            <a:lvl9pPr marR="0" lvl="8" algn="l" rtl="0">
+              <a:lnSpc>
+                <a:spcPct val="100000"/>
+              </a:lnSpc>
+              <a:spcBef>
+                <a:spcPts val="0"/>
+              </a:spcBef>
+              <a:spcAft>
+                <a:spcPts val="0"/>
+              </a:spcAft>
+              <a:buClr>
+                <a:schemeClr val="lt1"/>
+              </a:buClr>
+              <a:buSzPts val="6000"/>
+              <a:buFont typeface="Titillium Web"/>
+              <a:buNone/>
+              <a:defRPr sz="8000" b="1" i="0" u="none" strike="noStrike" cap="none">
+                <a:solidFill>
+                  <a:schemeClr val="lt1"/>
+                </a:solidFill>
+                <a:latin typeface="Titillium Web"/>
+                <a:ea typeface="Titillium Web"/>
+                <a:cs typeface="Titillium Web"/>
+                <a:sym typeface="Titillium Web"/>
+              </a:defRPr>
+            </a:lvl9pPr>
+          </a:lstStyle>
+          <a:p>
+            <a:pPr algn="ctr"/>
+            <a:r>
+              <a:rPr lang="es-MX" sz="2000" b="0" dirty="0"/>
+              <a:t>28</a:t>
+            </a:r>
+          </a:p>
+        </p:txBody>
+      </p:sp>
+    </p:spTree>
+    <p:extLst>
+      <p:ext uri="{BB962C8B-B14F-4D97-AF65-F5344CB8AC3E}">
+        <p14:creationId xmlns:p14="http://schemas.microsoft.com/office/powerpoint/2010/main" val="972404391"/>
+      </p:ext>
+    </p:extLst>
+  </p:cSld>
+  <p:clrMapOvr>
+    <a:masterClrMapping/>
+  </p:clrMapOvr>
+</p:sld>
+</file>
+
+<file path=ppt/slides/slide29.xml><?xml version="1.0" encoding="utf-8"?>
+<p:sld xmlns:a="http://schemas.openxmlformats.org/drawingml/2006/main" xmlns:r="http://schemas.openxmlformats.org/officeDocument/2006/relationships" xmlns:p="http://schemas.openxmlformats.org/presentationml/2006/main">
+  <p:cSld>
+    <p:spTree>
+      <p:nvGrpSpPr>
+        <p:cNvPr id="1" name="Shape 53">
+          <a:extLst>
+            <a:ext uri="{FF2B5EF4-FFF2-40B4-BE49-F238E27FC236}">
               <a16:creationId xmlns:a16="http://schemas.microsoft.com/office/drawing/2014/main" id="{B2582E9E-B86C-2FDE-9499-5976469E6F7F}"/>
             </a:ext>
           </a:extLst>
@@ -51217,8 +51566,8 @@
         </p:nvSpPr>
         <p:spPr>
           <a:xfrm>
-            <a:off x="224840" y="6161772"/>
-            <a:ext cx="6898974" cy="266514"/>
+            <a:off x="125448" y="6438112"/>
+            <a:ext cx="8360360" cy="248967"/>
           </a:xfrm>
           <a:prstGeom prst="rect">
             <a:avLst/>

</xml_diff>